<commit_message>
Finished attack slides and added rem_ext.py
</commit_message>
<xml_diff>
--- a/attacker/AttackSlides.pptx
+++ b/attacker/AttackSlides.pptx
@@ -9,36 +9,41 @@
     <p:sldId id="257" r:id="rId3"/>
     <p:sldId id="262" r:id="rId4"/>
     <p:sldId id="263" r:id="rId5"/>
-    <p:sldId id="258" r:id="rId6"/>
-    <p:sldId id="266" r:id="rId7"/>
-    <p:sldId id="261" r:id="rId8"/>
-    <p:sldId id="264" r:id="rId9"/>
-    <p:sldId id="265" r:id="rId10"/>
-    <p:sldId id="267" r:id="rId11"/>
-    <p:sldId id="268" r:id="rId12"/>
-    <p:sldId id="269" r:id="rId13"/>
-    <p:sldId id="270" r:id="rId14"/>
-    <p:sldId id="259" r:id="rId15"/>
-    <p:sldId id="283" r:id="rId16"/>
-    <p:sldId id="284" r:id="rId17"/>
-    <p:sldId id="285" r:id="rId18"/>
-    <p:sldId id="286" r:id="rId19"/>
-    <p:sldId id="287" r:id="rId20"/>
-    <p:sldId id="288" r:id="rId21"/>
-    <p:sldId id="289" r:id="rId22"/>
-    <p:sldId id="260" r:id="rId23"/>
-    <p:sldId id="273" r:id="rId24"/>
-    <p:sldId id="274" r:id="rId25"/>
-    <p:sldId id="275" r:id="rId26"/>
-    <p:sldId id="276" r:id="rId27"/>
-    <p:sldId id="277" r:id="rId28"/>
-    <p:sldId id="279" r:id="rId29"/>
-    <p:sldId id="278" r:id="rId30"/>
-    <p:sldId id="280" r:id="rId31"/>
-    <p:sldId id="272" r:id="rId32"/>
-    <p:sldId id="271" r:id="rId33"/>
-    <p:sldId id="281" r:id="rId34"/>
-    <p:sldId id="282" r:id="rId35"/>
+    <p:sldId id="292" r:id="rId6"/>
+    <p:sldId id="293" r:id="rId7"/>
+    <p:sldId id="294" r:id="rId8"/>
+    <p:sldId id="258" r:id="rId9"/>
+    <p:sldId id="266" r:id="rId10"/>
+    <p:sldId id="261" r:id="rId11"/>
+    <p:sldId id="264" r:id="rId12"/>
+    <p:sldId id="265" r:id="rId13"/>
+    <p:sldId id="267" r:id="rId14"/>
+    <p:sldId id="268" r:id="rId15"/>
+    <p:sldId id="269" r:id="rId16"/>
+    <p:sldId id="270" r:id="rId17"/>
+    <p:sldId id="259" r:id="rId18"/>
+    <p:sldId id="283" r:id="rId19"/>
+    <p:sldId id="284" r:id="rId20"/>
+    <p:sldId id="285" r:id="rId21"/>
+    <p:sldId id="286" r:id="rId22"/>
+    <p:sldId id="287" r:id="rId23"/>
+    <p:sldId id="288" r:id="rId24"/>
+    <p:sldId id="289" r:id="rId25"/>
+    <p:sldId id="260" r:id="rId26"/>
+    <p:sldId id="273" r:id="rId27"/>
+    <p:sldId id="274" r:id="rId28"/>
+    <p:sldId id="275" r:id="rId29"/>
+    <p:sldId id="276" r:id="rId30"/>
+    <p:sldId id="277" r:id="rId31"/>
+    <p:sldId id="279" r:id="rId32"/>
+    <p:sldId id="278" r:id="rId33"/>
+    <p:sldId id="280" r:id="rId34"/>
+    <p:sldId id="272" r:id="rId35"/>
+    <p:sldId id="271" r:id="rId36"/>
+    <p:sldId id="291" r:id="rId37"/>
+    <p:sldId id="281" r:id="rId38"/>
+    <p:sldId id="282" r:id="rId39"/>
+    <p:sldId id="290" r:id="rId40"/>
   </p:sldIdLst>
   <p:sldSz cx="12192000" cy="6858000"/>
   <p:notesSz cx="6858000" cy="9144000"/>
@@ -137,6 +142,11 @@
       </a:defRPr>
     </a:lvl9pPr>
   </p:defaultTextStyle>
+  <p:extLst>
+    <p:ext uri="{EFAFB233-063F-42B5-8137-9DF3F51BA10A}">
+      <p15:sldGuideLst xmlns:p15="http://schemas.microsoft.com/office/powerpoint/2012/main"/>
+    </p:ext>
+  </p:extLst>
 </p:presentation>
 </file>
 
@@ -287,7 +297,7 @@
           <a:p>
             <a:fld id="{A5CE7FD4-0403-4900-89EA-BB2B497AEF90}" type="datetimeFigureOut">
               <a:rPr lang="en-US" smtClean="0"/>
-              <a:t>4/20/2023</a:t>
+              <a:t>4/23/2023</a:t>
             </a:fld>
             <a:endParaRPr lang="en-US"/>
           </a:p>
@@ -485,7 +495,7 @@
           <a:p>
             <a:fld id="{A5CE7FD4-0403-4900-89EA-BB2B497AEF90}" type="datetimeFigureOut">
               <a:rPr lang="en-US" smtClean="0"/>
-              <a:t>4/20/2023</a:t>
+              <a:t>4/23/2023</a:t>
             </a:fld>
             <a:endParaRPr lang="en-US"/>
           </a:p>
@@ -693,7 +703,7 @@
           <a:p>
             <a:fld id="{A5CE7FD4-0403-4900-89EA-BB2B497AEF90}" type="datetimeFigureOut">
               <a:rPr lang="en-US" smtClean="0"/>
-              <a:t>4/20/2023</a:t>
+              <a:t>4/23/2023</a:t>
             </a:fld>
             <a:endParaRPr lang="en-US"/>
           </a:p>
@@ -891,7 +901,7 @@
           <a:p>
             <a:fld id="{A5CE7FD4-0403-4900-89EA-BB2B497AEF90}" type="datetimeFigureOut">
               <a:rPr lang="en-US" smtClean="0"/>
-              <a:t>4/20/2023</a:t>
+              <a:t>4/23/2023</a:t>
             </a:fld>
             <a:endParaRPr lang="en-US"/>
           </a:p>
@@ -1166,7 +1176,7 @@
           <a:p>
             <a:fld id="{A5CE7FD4-0403-4900-89EA-BB2B497AEF90}" type="datetimeFigureOut">
               <a:rPr lang="en-US" smtClean="0"/>
-              <a:t>4/20/2023</a:t>
+              <a:t>4/23/2023</a:t>
             </a:fld>
             <a:endParaRPr lang="en-US"/>
           </a:p>
@@ -1431,7 +1441,7 @@
           <a:p>
             <a:fld id="{A5CE7FD4-0403-4900-89EA-BB2B497AEF90}" type="datetimeFigureOut">
               <a:rPr lang="en-US" smtClean="0"/>
-              <a:t>4/20/2023</a:t>
+              <a:t>4/23/2023</a:t>
             </a:fld>
             <a:endParaRPr lang="en-US"/>
           </a:p>
@@ -1843,7 +1853,7 @@
           <a:p>
             <a:fld id="{A5CE7FD4-0403-4900-89EA-BB2B497AEF90}" type="datetimeFigureOut">
               <a:rPr lang="en-US" smtClean="0"/>
-              <a:t>4/20/2023</a:t>
+              <a:t>4/23/2023</a:t>
             </a:fld>
             <a:endParaRPr lang="en-US"/>
           </a:p>
@@ -1984,7 +1994,7 @@
           <a:p>
             <a:fld id="{A5CE7FD4-0403-4900-89EA-BB2B497AEF90}" type="datetimeFigureOut">
               <a:rPr lang="en-US" smtClean="0"/>
-              <a:t>4/20/2023</a:t>
+              <a:t>4/23/2023</a:t>
             </a:fld>
             <a:endParaRPr lang="en-US"/>
           </a:p>
@@ -2097,7 +2107,7 @@
           <a:p>
             <a:fld id="{A5CE7FD4-0403-4900-89EA-BB2B497AEF90}" type="datetimeFigureOut">
               <a:rPr lang="en-US" smtClean="0"/>
-              <a:t>4/20/2023</a:t>
+              <a:t>4/23/2023</a:t>
             </a:fld>
             <a:endParaRPr lang="en-US"/>
           </a:p>
@@ -2408,7 +2418,7 @@
           <a:p>
             <a:fld id="{A5CE7FD4-0403-4900-89EA-BB2B497AEF90}" type="datetimeFigureOut">
               <a:rPr lang="en-US" smtClean="0"/>
-              <a:t>4/20/2023</a:t>
+              <a:t>4/23/2023</a:t>
             </a:fld>
             <a:endParaRPr lang="en-US"/>
           </a:p>
@@ -2696,7 +2706,7 @@
           <a:p>
             <a:fld id="{A5CE7FD4-0403-4900-89EA-BB2B497AEF90}" type="datetimeFigureOut">
               <a:rPr lang="en-US" smtClean="0"/>
-              <a:t>4/20/2023</a:t>
+              <a:t>4/23/2023</a:t>
             </a:fld>
             <a:endParaRPr lang="en-US"/>
           </a:p>
@@ -2937,7 +2947,7 @@
           <a:p>
             <a:fld id="{A5CE7FD4-0403-4900-89EA-BB2B497AEF90}" type="datetimeFigureOut">
               <a:rPr lang="en-US" smtClean="0"/>
-              <a:t>4/20/2023</a:t>
+              <a:t>4/23/2023</a:t>
             </a:fld>
             <a:endParaRPr lang="en-US"/>
           </a:p>
@@ -3442,6 +3452,324 @@
           <p:cNvPr id="2" name="Title 1">
             <a:extLst>
               <a:ext uri="{FF2B5EF4-FFF2-40B4-BE49-F238E27FC236}">
+                <a16:creationId xmlns:a16="http://schemas.microsoft.com/office/drawing/2014/main" id="{14D63346-F92A-944A-2575-2BE5B0A79CD3}"/>
+              </a:ext>
+            </a:extLst>
+          </p:cNvPr>
+          <p:cNvSpPr>
+            <a:spLocks noGrp="1"/>
+          </p:cNvSpPr>
+          <p:nvPr>
+            <p:ph type="title"/>
+          </p:nvPr>
+        </p:nvSpPr>
+        <p:spPr/>
+        <p:txBody>
+          <a:bodyPr/>
+          <a:lstStyle/>
+          <a:p>
+            <a:r>
+              <a:rPr lang="en-US" dirty="0"/>
+              <a:t>Attack v1 Visualization</a:t>
+            </a:r>
+          </a:p>
+        </p:txBody>
+      </p:sp>
+      <p:pic>
+        <p:nvPicPr>
+          <p:cNvPr id="5" name="Picture 4" descr="Text&#10;&#10;Description automatically generated">
+            <a:extLst>
+              <a:ext uri="{FF2B5EF4-FFF2-40B4-BE49-F238E27FC236}">
+                <a16:creationId xmlns:a16="http://schemas.microsoft.com/office/drawing/2014/main" id="{EA83D573-93A7-385F-9C47-C60B05B27694}"/>
+              </a:ext>
+            </a:extLst>
+          </p:cNvPr>
+          <p:cNvPicPr>
+            <a:picLocks noChangeAspect="1"/>
+          </p:cNvPicPr>
+          <p:nvPr/>
+        </p:nvPicPr>
+        <p:blipFill>
+          <a:blip r:embed="rId2">
+            <a:extLst>
+              <a:ext uri="{28A0092B-C50C-407E-A947-70E740481C1C}">
+                <a14:useLocalDpi xmlns:a14="http://schemas.microsoft.com/office/drawing/2010/main" val="0"/>
+              </a:ext>
+            </a:extLst>
+          </a:blip>
+          <a:stretch>
+            <a:fillRect/>
+          </a:stretch>
+        </p:blipFill>
+        <p:spPr>
+          <a:xfrm>
+            <a:off x="2492992" y="1927724"/>
+            <a:ext cx="7206016" cy="3759070"/>
+          </a:xfrm>
+          <a:prstGeom prst="rect">
+            <a:avLst/>
+          </a:prstGeom>
+        </p:spPr>
+      </p:pic>
+    </p:spTree>
+    <p:extLst>
+      <p:ext uri="{BB962C8B-B14F-4D97-AF65-F5344CB8AC3E}">
+        <p14:creationId xmlns:p14="http://schemas.microsoft.com/office/powerpoint/2010/main" val="3766210935"/>
+      </p:ext>
+    </p:extLst>
+  </p:cSld>
+  <p:clrMapOvr>
+    <a:masterClrMapping/>
+  </p:clrMapOvr>
+</p:sld>
+</file>
+
+<file path=ppt/slides/slide11.xml><?xml version="1.0" encoding="utf-8"?>
+<p:sld xmlns:a="http://schemas.openxmlformats.org/drawingml/2006/main" xmlns:r="http://schemas.openxmlformats.org/officeDocument/2006/relationships" xmlns:p="http://schemas.openxmlformats.org/presentationml/2006/main">
+  <p:cSld>
+    <p:spTree>
+      <p:nvGrpSpPr>
+        <p:cNvPr id="1" name=""/>
+        <p:cNvGrpSpPr/>
+        <p:nvPr/>
+      </p:nvGrpSpPr>
+      <p:grpSpPr>
+        <a:xfrm>
+          <a:off x="0" y="0"/>
+          <a:ext cx="0" cy="0"/>
+          <a:chOff x="0" y="0"/>
+          <a:chExt cx="0" cy="0"/>
+        </a:xfrm>
+      </p:grpSpPr>
+      <p:sp>
+        <p:nvSpPr>
+          <p:cNvPr id="2" name="Title 1">
+            <a:extLst>
+              <a:ext uri="{FF2B5EF4-FFF2-40B4-BE49-F238E27FC236}">
+                <a16:creationId xmlns:a16="http://schemas.microsoft.com/office/drawing/2014/main" id="{14D63346-F92A-944A-2575-2BE5B0A79CD3}"/>
+              </a:ext>
+            </a:extLst>
+          </p:cNvPr>
+          <p:cNvSpPr>
+            <a:spLocks noGrp="1"/>
+          </p:cNvSpPr>
+          <p:nvPr>
+            <p:ph type="title"/>
+          </p:nvPr>
+        </p:nvSpPr>
+        <p:spPr/>
+        <p:txBody>
+          <a:bodyPr/>
+          <a:lstStyle/>
+          <a:p>
+            <a:r>
+              <a:rPr lang="en-US" dirty="0"/>
+              <a:t>Attack v1 Visualization</a:t>
+            </a:r>
+          </a:p>
+        </p:txBody>
+      </p:sp>
+      <p:pic>
+        <p:nvPicPr>
+          <p:cNvPr id="5" name="Picture 4" descr="Text&#10;&#10;Description automatically generated">
+            <a:extLst>
+              <a:ext uri="{FF2B5EF4-FFF2-40B4-BE49-F238E27FC236}">
+                <a16:creationId xmlns:a16="http://schemas.microsoft.com/office/drawing/2014/main" id="{F409F10A-B260-71CA-01DF-3FF3F5CF9E12}"/>
+              </a:ext>
+            </a:extLst>
+          </p:cNvPr>
+          <p:cNvPicPr>
+            <a:picLocks noChangeAspect="1"/>
+          </p:cNvPicPr>
+          <p:nvPr/>
+        </p:nvPicPr>
+        <p:blipFill>
+          <a:blip r:embed="rId2">
+            <a:extLst>
+              <a:ext uri="{28A0092B-C50C-407E-A947-70E740481C1C}">
+                <a14:useLocalDpi xmlns:a14="http://schemas.microsoft.com/office/drawing/2010/main" val="0"/>
+              </a:ext>
+            </a:extLst>
+          </a:blip>
+          <a:stretch>
+            <a:fillRect/>
+          </a:stretch>
+        </p:blipFill>
+        <p:spPr>
+          <a:xfrm>
+            <a:off x="1599572" y="1899995"/>
+            <a:ext cx="8992855" cy="3477110"/>
+          </a:xfrm>
+          <a:prstGeom prst="rect">
+            <a:avLst/>
+          </a:prstGeom>
+        </p:spPr>
+      </p:pic>
+    </p:spTree>
+    <p:extLst>
+      <p:ext uri="{BB962C8B-B14F-4D97-AF65-F5344CB8AC3E}">
+        <p14:creationId xmlns:p14="http://schemas.microsoft.com/office/powerpoint/2010/main" val="1092951323"/>
+      </p:ext>
+    </p:extLst>
+  </p:cSld>
+  <p:clrMapOvr>
+    <a:masterClrMapping/>
+  </p:clrMapOvr>
+</p:sld>
+</file>
+
+<file path=ppt/slides/slide12.xml><?xml version="1.0" encoding="utf-8"?>
+<p:sld xmlns:a="http://schemas.openxmlformats.org/drawingml/2006/main" xmlns:r="http://schemas.openxmlformats.org/officeDocument/2006/relationships" xmlns:p="http://schemas.openxmlformats.org/presentationml/2006/main">
+  <p:cSld>
+    <p:spTree>
+      <p:nvGrpSpPr>
+        <p:cNvPr id="1" name=""/>
+        <p:cNvGrpSpPr/>
+        <p:nvPr/>
+      </p:nvGrpSpPr>
+      <p:grpSpPr>
+        <a:xfrm>
+          <a:off x="0" y="0"/>
+          <a:ext cx="0" cy="0"/>
+          <a:chOff x="0" y="0"/>
+          <a:chExt cx="0" cy="0"/>
+        </a:xfrm>
+      </p:grpSpPr>
+      <p:sp>
+        <p:nvSpPr>
+          <p:cNvPr id="2" name="Title 1">
+            <a:extLst>
+              <a:ext uri="{FF2B5EF4-FFF2-40B4-BE49-F238E27FC236}">
+                <a16:creationId xmlns:a16="http://schemas.microsoft.com/office/drawing/2014/main" id="{14D63346-F92A-944A-2575-2BE5B0A79CD3}"/>
+              </a:ext>
+            </a:extLst>
+          </p:cNvPr>
+          <p:cNvSpPr>
+            <a:spLocks noGrp="1"/>
+          </p:cNvSpPr>
+          <p:nvPr>
+            <p:ph type="title"/>
+          </p:nvPr>
+        </p:nvSpPr>
+        <p:spPr/>
+        <p:txBody>
+          <a:bodyPr/>
+          <a:lstStyle/>
+          <a:p>
+            <a:r>
+              <a:rPr lang="en-US" dirty="0"/>
+              <a:t>Attack v1 Visualization</a:t>
+            </a:r>
+          </a:p>
+        </p:txBody>
+      </p:sp>
+      <p:pic>
+        <p:nvPicPr>
+          <p:cNvPr id="5" name="Picture 4" descr="Text&#10;&#10;Description automatically generated">
+            <a:extLst>
+              <a:ext uri="{FF2B5EF4-FFF2-40B4-BE49-F238E27FC236}">
+                <a16:creationId xmlns:a16="http://schemas.microsoft.com/office/drawing/2014/main" id="{E27216BE-849E-C148-B0BC-EE44E876A663}"/>
+              </a:ext>
+            </a:extLst>
+          </p:cNvPr>
+          <p:cNvPicPr>
+            <a:picLocks noChangeAspect="1"/>
+          </p:cNvPicPr>
+          <p:nvPr/>
+        </p:nvPicPr>
+        <p:blipFill>
+          <a:blip r:embed="rId2">
+            <a:extLst>
+              <a:ext uri="{28A0092B-C50C-407E-A947-70E740481C1C}">
+                <a14:useLocalDpi xmlns:a14="http://schemas.microsoft.com/office/drawing/2010/main" val="0"/>
+              </a:ext>
+            </a:extLst>
+          </a:blip>
+          <a:stretch>
+            <a:fillRect/>
+          </a:stretch>
+        </p:blipFill>
+        <p:spPr>
+          <a:xfrm>
+            <a:off x="1666257" y="1690687"/>
+            <a:ext cx="4429743" cy="4553585"/>
+          </a:xfrm>
+          <a:prstGeom prst="rect">
+            <a:avLst/>
+          </a:prstGeom>
+        </p:spPr>
+      </p:pic>
+      <p:pic>
+        <p:nvPicPr>
+          <p:cNvPr id="7" name="Picture 6" descr="Text&#10;&#10;Description automatically generated">
+            <a:extLst>
+              <a:ext uri="{FF2B5EF4-FFF2-40B4-BE49-F238E27FC236}">
+                <a16:creationId xmlns:a16="http://schemas.microsoft.com/office/drawing/2014/main" id="{B51071DA-4946-5E2B-E820-06D726E22D10}"/>
+              </a:ext>
+            </a:extLst>
+          </p:cNvPr>
+          <p:cNvPicPr>
+            <a:picLocks noChangeAspect="1"/>
+          </p:cNvPicPr>
+          <p:nvPr/>
+        </p:nvPicPr>
+        <p:blipFill>
+          <a:blip r:embed="rId3">
+            <a:extLst>
+              <a:ext uri="{28A0092B-C50C-407E-A947-70E740481C1C}">
+                <a14:useLocalDpi xmlns:a14="http://schemas.microsoft.com/office/drawing/2010/main" val="0"/>
+              </a:ext>
+            </a:extLst>
+          </a:blip>
+          <a:stretch>
+            <a:fillRect/>
+          </a:stretch>
+        </p:blipFill>
+        <p:spPr>
+          <a:xfrm>
+            <a:off x="6371915" y="2505187"/>
+            <a:ext cx="4439270" cy="2924583"/>
+          </a:xfrm>
+          <a:prstGeom prst="rect">
+            <a:avLst/>
+          </a:prstGeom>
+        </p:spPr>
+      </p:pic>
+    </p:spTree>
+    <p:extLst>
+      <p:ext uri="{BB962C8B-B14F-4D97-AF65-F5344CB8AC3E}">
+        <p14:creationId xmlns:p14="http://schemas.microsoft.com/office/powerpoint/2010/main" val="88909814"/>
+      </p:ext>
+    </p:extLst>
+  </p:cSld>
+  <p:clrMapOvr>
+    <a:masterClrMapping/>
+  </p:clrMapOvr>
+</p:sld>
+</file>
+
+<file path=ppt/slides/slide13.xml><?xml version="1.0" encoding="utf-8"?>
+<p:sld xmlns:a="http://schemas.openxmlformats.org/drawingml/2006/main" xmlns:r="http://schemas.openxmlformats.org/officeDocument/2006/relationships" xmlns:p="http://schemas.openxmlformats.org/presentationml/2006/main">
+  <p:cSld>
+    <p:spTree>
+      <p:nvGrpSpPr>
+        <p:cNvPr id="1" name=""/>
+        <p:cNvGrpSpPr/>
+        <p:nvPr/>
+      </p:nvGrpSpPr>
+      <p:grpSpPr>
+        <a:xfrm>
+          <a:off x="0" y="0"/>
+          <a:ext cx="0" cy="0"/>
+          <a:chOff x="0" y="0"/>
+          <a:chExt cx="0" cy="0"/>
+        </a:xfrm>
+      </p:grpSpPr>
+      <p:sp>
+        <p:nvSpPr>
+          <p:cNvPr id="2" name="Title 1">
+            <a:extLst>
+              <a:ext uri="{FF2B5EF4-FFF2-40B4-BE49-F238E27FC236}">
                 <a16:creationId xmlns:a16="http://schemas.microsoft.com/office/drawing/2014/main" id="{CA3AB646-4C73-B174-E071-D087189BB4AF}"/>
               </a:ext>
             </a:extLst>
@@ -3674,7 +4002,7 @@
 </p:sld>
 </file>
 
-<file path=ppt/slides/slide11.xml><?xml version="1.0" encoding="utf-8"?>
+<file path=ppt/slides/slide14.xml><?xml version="1.0" encoding="utf-8"?>
 <p:sld xmlns:a="http://schemas.openxmlformats.org/drawingml/2006/main" xmlns:r="http://schemas.openxmlformats.org/officeDocument/2006/relationships" xmlns:p="http://schemas.openxmlformats.org/presentationml/2006/main">
   <p:cSld>
     <p:spTree>
@@ -3807,7 +4135,7 @@
 </p:sld>
 </file>
 
-<file path=ppt/slides/slide12.xml><?xml version="1.0" encoding="utf-8"?>
+<file path=ppt/slides/slide15.xml><?xml version="1.0" encoding="utf-8"?>
 <p:sld xmlns:a="http://schemas.openxmlformats.org/drawingml/2006/main" xmlns:r="http://schemas.openxmlformats.org/officeDocument/2006/relationships" xmlns:p="http://schemas.openxmlformats.org/presentationml/2006/main">
   <p:cSld>
     <p:spTree>
@@ -3940,7 +4268,7 @@
 </p:sld>
 </file>
 
-<file path=ppt/slides/slide13.xml><?xml version="1.0" encoding="utf-8"?>
+<file path=ppt/slides/slide16.xml><?xml version="1.0" encoding="utf-8"?>
 <p:sld xmlns:a="http://schemas.openxmlformats.org/drawingml/2006/main" xmlns:r="http://schemas.openxmlformats.org/officeDocument/2006/relationships" xmlns:p="http://schemas.openxmlformats.org/presentationml/2006/main">
   <p:cSld>
     <p:spTree>
@@ -4079,7 +4407,7 @@
 </p:sld>
 </file>
 
-<file path=ppt/slides/slide14.xml><?xml version="1.0" encoding="utf-8"?>
+<file path=ppt/slides/slide17.xml><?xml version="1.0" encoding="utf-8"?>
 <p:sld xmlns:a="http://schemas.openxmlformats.org/drawingml/2006/main" xmlns:r="http://schemas.openxmlformats.org/officeDocument/2006/relationships" xmlns:p="http://schemas.openxmlformats.org/presentationml/2006/main">
   <p:cSld>
     <p:spTree>
@@ -4233,7 +4561,7 @@
 </p:sld>
 </file>
 
-<file path=ppt/slides/slide15.xml><?xml version="1.0" encoding="utf-8"?>
+<file path=ppt/slides/slide18.xml><?xml version="1.0" encoding="utf-8"?>
 <p:sld xmlns:a="http://schemas.openxmlformats.org/drawingml/2006/main" xmlns:r="http://schemas.openxmlformats.org/officeDocument/2006/relationships" xmlns:p="http://schemas.openxmlformats.org/presentationml/2006/main">
   <p:cSld>
     <p:spTree>
@@ -4391,7 +4719,7 @@
 </p:sld>
 </file>
 
-<file path=ppt/slides/slide16.xml><?xml version="1.0" encoding="utf-8"?>
+<file path=ppt/slides/slide19.xml><?xml version="1.0" encoding="utf-8"?>
 <p:sld xmlns:a="http://schemas.openxmlformats.org/drawingml/2006/main" xmlns:r="http://schemas.openxmlformats.org/officeDocument/2006/relationships" xmlns:p="http://schemas.openxmlformats.org/presentationml/2006/main">
   <p:cSld>
     <p:spTree>
@@ -4504,377 +4832,6 @@
     <p:extLst>
       <p:ext uri="{BB962C8B-B14F-4D97-AF65-F5344CB8AC3E}">
         <p14:creationId xmlns:p14="http://schemas.microsoft.com/office/powerpoint/2010/main" val="911981526"/>
-      </p:ext>
-    </p:extLst>
-  </p:cSld>
-  <p:clrMapOvr>
-    <a:masterClrMapping/>
-  </p:clrMapOvr>
-</p:sld>
-</file>
-
-<file path=ppt/slides/slide17.xml><?xml version="1.0" encoding="utf-8"?>
-<p:sld xmlns:a="http://schemas.openxmlformats.org/drawingml/2006/main" xmlns:r="http://schemas.openxmlformats.org/officeDocument/2006/relationships" xmlns:p="http://schemas.openxmlformats.org/presentationml/2006/main">
-  <p:cSld>
-    <p:spTree>
-      <p:nvGrpSpPr>
-        <p:cNvPr id="1" name=""/>
-        <p:cNvGrpSpPr/>
-        <p:nvPr/>
-      </p:nvGrpSpPr>
-      <p:grpSpPr>
-        <a:xfrm>
-          <a:off x="0" y="0"/>
-          <a:ext cx="0" cy="0"/>
-          <a:chOff x="0" y="0"/>
-          <a:chExt cx="0" cy="0"/>
-        </a:xfrm>
-      </p:grpSpPr>
-      <p:sp>
-        <p:nvSpPr>
-          <p:cNvPr id="2" name="Title 1">
-            <a:extLst>
-              <a:ext uri="{FF2B5EF4-FFF2-40B4-BE49-F238E27FC236}">
-                <a16:creationId xmlns:a16="http://schemas.microsoft.com/office/drawing/2014/main" id="{F97B4B14-44A2-2C41-95B9-C11EB08EDF8C}"/>
-              </a:ext>
-            </a:extLst>
-          </p:cNvPr>
-          <p:cNvSpPr>
-            <a:spLocks noGrp="1"/>
-          </p:cNvSpPr>
-          <p:nvPr>
-            <p:ph type="title"/>
-          </p:nvPr>
-        </p:nvSpPr>
-        <p:spPr/>
-        <p:txBody>
-          <a:bodyPr/>
-          <a:lstStyle/>
-          <a:p>
-            <a:r>
-              <a:rPr lang="en-US" dirty="0"/>
-              <a:t>Attack v2 Visualization</a:t>
-            </a:r>
-          </a:p>
-        </p:txBody>
-      </p:sp>
-      <p:sp>
-        <p:nvSpPr>
-          <p:cNvPr id="3" name="Content Placeholder 2">
-            <a:extLst>
-              <a:ext uri="{FF2B5EF4-FFF2-40B4-BE49-F238E27FC236}">
-                <a16:creationId xmlns:a16="http://schemas.microsoft.com/office/drawing/2014/main" id="{9917A5DD-384A-11CC-CAD0-D5C6C90D4224}"/>
-              </a:ext>
-            </a:extLst>
-          </p:cNvPr>
-          <p:cNvSpPr>
-            <a:spLocks noGrp="1"/>
-          </p:cNvSpPr>
-          <p:nvPr>
-            <p:ph idx="1"/>
-          </p:nvPr>
-        </p:nvSpPr>
-        <p:spPr/>
-        <p:txBody>
-          <a:bodyPr/>
-          <a:lstStyle/>
-          <a:p>
-            <a:r>
-              <a:rPr lang="en-US" dirty="0"/>
-              <a:t>Manual int array size calculation and </a:t>
-            </a:r>
-            <a:r>
-              <a:rPr lang="en-US" dirty="0" err="1"/>
-              <a:t>strcmp</a:t>
-            </a:r>
-            <a:endParaRPr lang="en-US" dirty="0"/>
-          </a:p>
-        </p:txBody>
-      </p:sp>
-      <p:pic>
-        <p:nvPicPr>
-          <p:cNvPr id="5" name="Picture 4" descr="Text&#10;&#10;Description automatically generated">
-            <a:extLst>
-              <a:ext uri="{FF2B5EF4-FFF2-40B4-BE49-F238E27FC236}">
-                <a16:creationId xmlns:a16="http://schemas.microsoft.com/office/drawing/2014/main" id="{07DAC063-CFFD-4417-BB02-33751BB59F75}"/>
-              </a:ext>
-            </a:extLst>
-          </p:cNvPr>
-          <p:cNvPicPr>
-            <a:picLocks noChangeAspect="1"/>
-          </p:cNvPicPr>
-          <p:nvPr/>
-        </p:nvPicPr>
-        <p:blipFill>
-          <a:blip r:embed="rId2">
-            <a:extLst>
-              <a:ext uri="{28A0092B-C50C-407E-A947-70E740481C1C}">
-                <a14:useLocalDpi xmlns:a14="http://schemas.microsoft.com/office/drawing/2010/main" val="0"/>
-              </a:ext>
-            </a:extLst>
-          </a:blip>
-          <a:stretch>
-            <a:fillRect/>
-          </a:stretch>
-        </p:blipFill>
-        <p:spPr>
-          <a:xfrm>
-            <a:off x="4113184" y="2749659"/>
-            <a:ext cx="3965631" cy="2912260"/>
-          </a:xfrm>
-          <a:prstGeom prst="rect">
-            <a:avLst/>
-          </a:prstGeom>
-        </p:spPr>
-      </p:pic>
-    </p:spTree>
-    <p:extLst>
-      <p:ext uri="{BB962C8B-B14F-4D97-AF65-F5344CB8AC3E}">
-        <p14:creationId xmlns:p14="http://schemas.microsoft.com/office/powerpoint/2010/main" val="781258831"/>
-      </p:ext>
-    </p:extLst>
-  </p:cSld>
-  <p:clrMapOvr>
-    <a:masterClrMapping/>
-  </p:clrMapOvr>
-</p:sld>
-</file>
-
-<file path=ppt/slides/slide18.xml><?xml version="1.0" encoding="utf-8"?>
-<p:sld xmlns:a="http://schemas.openxmlformats.org/drawingml/2006/main" xmlns:r="http://schemas.openxmlformats.org/officeDocument/2006/relationships" xmlns:p="http://schemas.openxmlformats.org/presentationml/2006/main">
-  <p:cSld>
-    <p:spTree>
-      <p:nvGrpSpPr>
-        <p:cNvPr id="1" name=""/>
-        <p:cNvGrpSpPr/>
-        <p:nvPr/>
-      </p:nvGrpSpPr>
-      <p:grpSpPr>
-        <a:xfrm>
-          <a:off x="0" y="0"/>
-          <a:ext cx="0" cy="0"/>
-          <a:chOff x="0" y="0"/>
-          <a:chExt cx="0" cy="0"/>
-        </a:xfrm>
-      </p:grpSpPr>
-      <p:sp>
-        <p:nvSpPr>
-          <p:cNvPr id="2" name="Title 1">
-            <a:extLst>
-              <a:ext uri="{FF2B5EF4-FFF2-40B4-BE49-F238E27FC236}">
-                <a16:creationId xmlns:a16="http://schemas.microsoft.com/office/drawing/2014/main" id="{F97B4B14-44A2-2C41-95B9-C11EB08EDF8C}"/>
-              </a:ext>
-            </a:extLst>
-          </p:cNvPr>
-          <p:cNvSpPr>
-            <a:spLocks noGrp="1"/>
-          </p:cNvSpPr>
-          <p:nvPr>
-            <p:ph type="title"/>
-          </p:nvPr>
-        </p:nvSpPr>
-        <p:spPr/>
-        <p:txBody>
-          <a:bodyPr/>
-          <a:lstStyle/>
-          <a:p>
-            <a:r>
-              <a:rPr lang="en-US" dirty="0"/>
-              <a:t>Attack v2 Visualization</a:t>
-            </a:r>
-          </a:p>
-        </p:txBody>
-      </p:sp>
-      <p:sp>
-        <p:nvSpPr>
-          <p:cNvPr id="3" name="Content Placeholder 2">
-            <a:extLst>
-              <a:ext uri="{FF2B5EF4-FFF2-40B4-BE49-F238E27FC236}">
-                <a16:creationId xmlns:a16="http://schemas.microsoft.com/office/drawing/2014/main" id="{9917A5DD-384A-11CC-CAD0-D5C6C90D4224}"/>
-              </a:ext>
-            </a:extLst>
-          </p:cNvPr>
-          <p:cNvSpPr>
-            <a:spLocks noGrp="1"/>
-          </p:cNvSpPr>
-          <p:nvPr>
-            <p:ph idx="1"/>
-          </p:nvPr>
-        </p:nvSpPr>
-        <p:spPr/>
-        <p:txBody>
-          <a:bodyPr/>
-          <a:lstStyle/>
-          <a:p>
-            <a:r>
-              <a:rPr lang="en-US" dirty="0"/>
-              <a:t>Library loading error checking and abstraction</a:t>
-            </a:r>
-          </a:p>
-        </p:txBody>
-      </p:sp>
-      <p:pic>
-        <p:nvPicPr>
-          <p:cNvPr id="5" name="Picture 4" descr="Graphical user interface, text, application, chat or text message&#10;&#10;Description automatically generated">
-            <a:extLst>
-              <a:ext uri="{FF2B5EF4-FFF2-40B4-BE49-F238E27FC236}">
-                <a16:creationId xmlns:a16="http://schemas.microsoft.com/office/drawing/2014/main" id="{B679C0D6-2B10-D9F0-4BDF-5A4DA8AA63A4}"/>
-              </a:ext>
-            </a:extLst>
-          </p:cNvPr>
-          <p:cNvPicPr>
-            <a:picLocks noChangeAspect="1"/>
-          </p:cNvPicPr>
-          <p:nvPr/>
-        </p:nvPicPr>
-        <p:blipFill>
-          <a:blip r:embed="rId2">
-            <a:extLst>
-              <a:ext uri="{28A0092B-C50C-407E-A947-70E740481C1C}">
-                <a14:useLocalDpi xmlns:a14="http://schemas.microsoft.com/office/drawing/2010/main" val="0"/>
-              </a:ext>
-            </a:extLst>
-          </a:blip>
-          <a:stretch>
-            <a:fillRect/>
-          </a:stretch>
-        </p:blipFill>
-        <p:spPr>
-          <a:xfrm>
-            <a:off x="3204692" y="2489703"/>
-            <a:ext cx="5782615" cy="3822197"/>
-          </a:xfrm>
-          <a:prstGeom prst="rect">
-            <a:avLst/>
-          </a:prstGeom>
-        </p:spPr>
-      </p:pic>
-    </p:spTree>
-    <p:extLst>
-      <p:ext uri="{BB962C8B-B14F-4D97-AF65-F5344CB8AC3E}">
-        <p14:creationId xmlns:p14="http://schemas.microsoft.com/office/powerpoint/2010/main" val="1119563347"/>
-      </p:ext>
-    </p:extLst>
-  </p:cSld>
-  <p:clrMapOvr>
-    <a:masterClrMapping/>
-  </p:clrMapOvr>
-</p:sld>
-</file>
-
-<file path=ppt/slides/slide19.xml><?xml version="1.0" encoding="utf-8"?>
-<p:sld xmlns:a="http://schemas.openxmlformats.org/drawingml/2006/main" xmlns:r="http://schemas.openxmlformats.org/officeDocument/2006/relationships" xmlns:p="http://schemas.openxmlformats.org/presentationml/2006/main">
-  <p:cSld>
-    <p:spTree>
-      <p:nvGrpSpPr>
-        <p:cNvPr id="1" name=""/>
-        <p:cNvGrpSpPr/>
-        <p:nvPr/>
-      </p:nvGrpSpPr>
-      <p:grpSpPr>
-        <a:xfrm>
-          <a:off x="0" y="0"/>
-          <a:ext cx="0" cy="0"/>
-          <a:chOff x="0" y="0"/>
-          <a:chExt cx="0" cy="0"/>
-        </a:xfrm>
-      </p:grpSpPr>
-      <p:sp>
-        <p:nvSpPr>
-          <p:cNvPr id="2" name="Title 1">
-            <a:extLst>
-              <a:ext uri="{FF2B5EF4-FFF2-40B4-BE49-F238E27FC236}">
-                <a16:creationId xmlns:a16="http://schemas.microsoft.com/office/drawing/2014/main" id="{F97B4B14-44A2-2C41-95B9-C11EB08EDF8C}"/>
-              </a:ext>
-            </a:extLst>
-          </p:cNvPr>
-          <p:cNvSpPr>
-            <a:spLocks noGrp="1"/>
-          </p:cNvSpPr>
-          <p:nvPr>
-            <p:ph type="title"/>
-          </p:nvPr>
-        </p:nvSpPr>
-        <p:spPr/>
-        <p:txBody>
-          <a:bodyPr/>
-          <a:lstStyle/>
-          <a:p>
-            <a:r>
-              <a:rPr lang="en-US" dirty="0"/>
-              <a:t>Attack v2 Visualization</a:t>
-            </a:r>
-          </a:p>
-        </p:txBody>
-      </p:sp>
-      <p:sp>
-        <p:nvSpPr>
-          <p:cNvPr id="3" name="Content Placeholder 2">
-            <a:extLst>
-              <a:ext uri="{FF2B5EF4-FFF2-40B4-BE49-F238E27FC236}">
-                <a16:creationId xmlns:a16="http://schemas.microsoft.com/office/drawing/2014/main" id="{9917A5DD-384A-11CC-CAD0-D5C6C90D4224}"/>
-              </a:ext>
-            </a:extLst>
-          </p:cNvPr>
-          <p:cNvSpPr>
-            <a:spLocks noGrp="1"/>
-          </p:cNvSpPr>
-          <p:nvPr>
-            <p:ph idx="1"/>
-          </p:nvPr>
-        </p:nvSpPr>
-        <p:spPr/>
-        <p:txBody>
-          <a:bodyPr/>
-          <a:lstStyle/>
-          <a:p>
-            <a:r>
-              <a:rPr lang="en-US" dirty="0"/>
-              <a:t>Actual dropper run abstraction and GETINTRESOURCE obfuscation</a:t>
-            </a:r>
-          </a:p>
-        </p:txBody>
-      </p:sp>
-      <p:pic>
-        <p:nvPicPr>
-          <p:cNvPr id="5" name="Picture 4" descr="Text&#10;&#10;Description automatically generated">
-            <a:extLst>
-              <a:ext uri="{FF2B5EF4-FFF2-40B4-BE49-F238E27FC236}">
-                <a16:creationId xmlns:a16="http://schemas.microsoft.com/office/drawing/2014/main" id="{2BAC2E22-3CAB-6DA5-1C39-9885005575DD}"/>
-              </a:ext>
-            </a:extLst>
-          </p:cNvPr>
-          <p:cNvPicPr>
-            <a:picLocks noChangeAspect="1"/>
-          </p:cNvPicPr>
-          <p:nvPr/>
-        </p:nvPicPr>
-        <p:blipFill>
-          <a:blip r:embed="rId2">
-            <a:extLst>
-              <a:ext uri="{28A0092B-C50C-407E-A947-70E740481C1C}">
-                <a14:useLocalDpi xmlns:a14="http://schemas.microsoft.com/office/drawing/2010/main" val="0"/>
-              </a:ext>
-            </a:extLst>
-          </a:blip>
-          <a:stretch>
-            <a:fillRect/>
-          </a:stretch>
-        </p:blipFill>
-        <p:spPr>
-          <a:xfrm>
-            <a:off x="3268324" y="2426328"/>
-            <a:ext cx="5655351" cy="4247616"/>
-          </a:xfrm>
-          <a:prstGeom prst="rect">
-            <a:avLst/>
-          </a:prstGeom>
-        </p:spPr>
-      </p:pic>
-    </p:spTree>
-    <p:extLst>
-      <p:ext uri="{BB962C8B-B14F-4D97-AF65-F5344CB8AC3E}">
-        <p14:creationId xmlns:p14="http://schemas.microsoft.com/office/powerpoint/2010/main" val="1153571681"/>
       </p:ext>
     </p:extLst>
   </p:cSld>
@@ -5012,7 +4969,7 @@
           <p:cNvPr id="2" name="Title 1">
             <a:extLst>
               <a:ext uri="{FF2B5EF4-FFF2-40B4-BE49-F238E27FC236}">
-                <a16:creationId xmlns:a16="http://schemas.microsoft.com/office/drawing/2014/main" id="{DD2AEB79-E092-9B3F-A242-7C8998FFD105}"/>
+                <a16:creationId xmlns:a16="http://schemas.microsoft.com/office/drawing/2014/main" id="{F97B4B14-44A2-2C41-95B9-C11EB08EDF8C}"/>
               </a:ext>
             </a:extLst>
           </p:cNvPr>
@@ -5040,7 +4997,7 @@
           <p:cNvPr id="3" name="Content Placeholder 2">
             <a:extLst>
               <a:ext uri="{FF2B5EF4-FFF2-40B4-BE49-F238E27FC236}">
-                <a16:creationId xmlns:a16="http://schemas.microsoft.com/office/drawing/2014/main" id="{C08B4FDE-EF92-733D-9832-2576F0B60B9B}"/>
+                <a16:creationId xmlns:a16="http://schemas.microsoft.com/office/drawing/2014/main" id="{9917A5DD-384A-11CC-CAD0-D5C6C90D4224}"/>
               </a:ext>
             </a:extLst>
           </p:cNvPr>
@@ -5058,8 +5015,13 @@
           <a:p>
             <a:r>
               <a:rPr lang="en-US" dirty="0"/>
-              <a:t>Final main with manual Kernel32.dll parsing and dynamic loading</a:t>
-            </a:r>
+              <a:t>Manual int array size calculation and </a:t>
+            </a:r>
+            <a:r>
+              <a:rPr lang="en-US" dirty="0" err="1"/>
+              <a:t>strcmp</a:t>
+            </a:r>
+            <a:endParaRPr lang="en-US" dirty="0"/>
           </a:p>
         </p:txBody>
       </p:sp>
@@ -5068,7 +5030,7 @@
           <p:cNvPr id="5" name="Picture 4" descr="Text&#10;&#10;Description automatically generated">
             <a:extLst>
               <a:ext uri="{FF2B5EF4-FFF2-40B4-BE49-F238E27FC236}">
-                <a16:creationId xmlns:a16="http://schemas.microsoft.com/office/drawing/2014/main" id="{65BDEFB5-F5E3-C01C-CB94-A1CAFB54BC62}"/>
+                <a16:creationId xmlns:a16="http://schemas.microsoft.com/office/drawing/2014/main" id="{07DAC063-CFFD-4417-BB02-33751BB59F75}"/>
               </a:ext>
             </a:extLst>
           </p:cNvPr>
@@ -5091,8 +5053,8 @@
         </p:blipFill>
         <p:spPr>
           <a:xfrm>
-            <a:off x="1988528" y="2342537"/>
-            <a:ext cx="8214943" cy="4372342"/>
+            <a:off x="4113184" y="2749659"/>
+            <a:ext cx="3965631" cy="2912260"/>
           </a:xfrm>
           <a:prstGeom prst="rect">
             <a:avLst/>
@@ -5102,7 +5064,7 @@
     </p:spTree>
     <p:extLst>
       <p:ext uri="{BB962C8B-B14F-4D97-AF65-F5344CB8AC3E}">
-        <p14:creationId xmlns:p14="http://schemas.microsoft.com/office/powerpoint/2010/main" val="748810606"/>
+        <p14:creationId xmlns:p14="http://schemas.microsoft.com/office/powerpoint/2010/main" val="781258831"/>
       </p:ext>
     </p:extLst>
   </p:cSld>
@@ -5134,7 +5096,7 @@
           <p:cNvPr id="2" name="Title 1">
             <a:extLst>
               <a:ext uri="{FF2B5EF4-FFF2-40B4-BE49-F238E27FC236}">
-                <a16:creationId xmlns:a16="http://schemas.microsoft.com/office/drawing/2014/main" id="{A9ECFAF4-F3C4-89E4-2719-0DE09764B26D}"/>
+                <a16:creationId xmlns:a16="http://schemas.microsoft.com/office/drawing/2014/main" id="{F97B4B14-44A2-2C41-95B9-C11EB08EDF8C}"/>
               </a:ext>
             </a:extLst>
           </p:cNvPr>
@@ -5152,7 +5114,7 @@
           <a:p>
             <a:r>
               <a:rPr lang="en-US" dirty="0"/>
-              <a:t>Attack v2 Results</a:t>
+              <a:t>Attack v2 Visualization</a:t>
             </a:r>
           </a:p>
         </p:txBody>
@@ -5162,7 +5124,7 @@
           <p:cNvPr id="3" name="Content Placeholder 2">
             <a:extLst>
               <a:ext uri="{FF2B5EF4-FFF2-40B4-BE49-F238E27FC236}">
-                <a16:creationId xmlns:a16="http://schemas.microsoft.com/office/drawing/2014/main" id="{B4B71F73-5C98-BB08-35CA-E0118CE1C665}"/>
+                <a16:creationId xmlns:a16="http://schemas.microsoft.com/office/drawing/2014/main" id="{9917A5DD-384A-11CC-CAD0-D5C6C90D4224}"/>
               </a:ext>
             </a:extLst>
           </p:cNvPr>
@@ -5179,20 +5141,52 @@
           <a:lstStyle/>
           <a:p>
             <a:r>
-              <a:rPr lang="en-US" dirty="0" err="1"/>
-              <a:t>VirusTotal</a:t>
-            </a:r>
-            <a:r>
-              <a:rPr lang="en-US" dirty="0"/>
-              <a:t> of Evade1-0000</a:t>
-            </a:r>
-          </a:p>
-        </p:txBody>
-      </p:sp>
+              <a:rPr lang="en-US" dirty="0"/>
+              <a:t>Library loading error checking and abstraction</a:t>
+            </a:r>
+          </a:p>
+        </p:txBody>
+      </p:sp>
+      <p:pic>
+        <p:nvPicPr>
+          <p:cNvPr id="5" name="Picture 4" descr="Graphical user interface, text, application, chat or text message&#10;&#10;Description automatically generated">
+            <a:extLst>
+              <a:ext uri="{FF2B5EF4-FFF2-40B4-BE49-F238E27FC236}">
+                <a16:creationId xmlns:a16="http://schemas.microsoft.com/office/drawing/2014/main" id="{B679C0D6-2B10-D9F0-4BDF-5A4DA8AA63A4}"/>
+              </a:ext>
+            </a:extLst>
+          </p:cNvPr>
+          <p:cNvPicPr>
+            <a:picLocks noChangeAspect="1"/>
+          </p:cNvPicPr>
+          <p:nvPr/>
+        </p:nvPicPr>
+        <p:blipFill>
+          <a:blip r:embed="rId2">
+            <a:extLst>
+              <a:ext uri="{28A0092B-C50C-407E-A947-70E740481C1C}">
+                <a14:useLocalDpi xmlns:a14="http://schemas.microsoft.com/office/drawing/2010/main" val="0"/>
+              </a:ext>
+            </a:extLst>
+          </a:blip>
+          <a:stretch>
+            <a:fillRect/>
+          </a:stretch>
+        </p:blipFill>
+        <p:spPr>
+          <a:xfrm>
+            <a:off x="3204692" y="2489703"/>
+            <a:ext cx="5782615" cy="3822197"/>
+          </a:xfrm>
+          <a:prstGeom prst="rect">
+            <a:avLst/>
+          </a:prstGeom>
+        </p:spPr>
+      </p:pic>
     </p:spTree>
     <p:extLst>
       <p:ext uri="{BB962C8B-B14F-4D97-AF65-F5344CB8AC3E}">
-        <p14:creationId xmlns:p14="http://schemas.microsoft.com/office/powerpoint/2010/main" val="373806978"/>
+        <p14:creationId xmlns:p14="http://schemas.microsoft.com/office/powerpoint/2010/main" val="1119563347"/>
       </p:ext>
     </p:extLst>
   </p:cSld>
@@ -5224,6 +5218,376 @@
           <p:cNvPr id="2" name="Title 1">
             <a:extLst>
               <a:ext uri="{FF2B5EF4-FFF2-40B4-BE49-F238E27FC236}">
+                <a16:creationId xmlns:a16="http://schemas.microsoft.com/office/drawing/2014/main" id="{F97B4B14-44A2-2C41-95B9-C11EB08EDF8C}"/>
+              </a:ext>
+            </a:extLst>
+          </p:cNvPr>
+          <p:cNvSpPr>
+            <a:spLocks noGrp="1"/>
+          </p:cNvSpPr>
+          <p:nvPr>
+            <p:ph type="title"/>
+          </p:nvPr>
+        </p:nvSpPr>
+        <p:spPr/>
+        <p:txBody>
+          <a:bodyPr/>
+          <a:lstStyle/>
+          <a:p>
+            <a:r>
+              <a:rPr lang="en-US" dirty="0"/>
+              <a:t>Attack v2 Visualization</a:t>
+            </a:r>
+          </a:p>
+        </p:txBody>
+      </p:sp>
+      <p:sp>
+        <p:nvSpPr>
+          <p:cNvPr id="3" name="Content Placeholder 2">
+            <a:extLst>
+              <a:ext uri="{FF2B5EF4-FFF2-40B4-BE49-F238E27FC236}">
+                <a16:creationId xmlns:a16="http://schemas.microsoft.com/office/drawing/2014/main" id="{9917A5DD-384A-11CC-CAD0-D5C6C90D4224}"/>
+              </a:ext>
+            </a:extLst>
+          </p:cNvPr>
+          <p:cNvSpPr>
+            <a:spLocks noGrp="1"/>
+          </p:cNvSpPr>
+          <p:nvPr>
+            <p:ph idx="1"/>
+          </p:nvPr>
+        </p:nvSpPr>
+        <p:spPr/>
+        <p:txBody>
+          <a:bodyPr/>
+          <a:lstStyle/>
+          <a:p>
+            <a:r>
+              <a:rPr lang="en-US" dirty="0"/>
+              <a:t>Actual dropper run abstraction and GETINTRESOURCE obfuscation</a:t>
+            </a:r>
+          </a:p>
+        </p:txBody>
+      </p:sp>
+      <p:pic>
+        <p:nvPicPr>
+          <p:cNvPr id="5" name="Picture 4" descr="Text&#10;&#10;Description automatically generated">
+            <a:extLst>
+              <a:ext uri="{FF2B5EF4-FFF2-40B4-BE49-F238E27FC236}">
+                <a16:creationId xmlns:a16="http://schemas.microsoft.com/office/drawing/2014/main" id="{2BAC2E22-3CAB-6DA5-1C39-9885005575DD}"/>
+              </a:ext>
+            </a:extLst>
+          </p:cNvPr>
+          <p:cNvPicPr>
+            <a:picLocks noChangeAspect="1"/>
+          </p:cNvPicPr>
+          <p:nvPr/>
+        </p:nvPicPr>
+        <p:blipFill>
+          <a:blip r:embed="rId2">
+            <a:extLst>
+              <a:ext uri="{28A0092B-C50C-407E-A947-70E740481C1C}">
+                <a14:useLocalDpi xmlns:a14="http://schemas.microsoft.com/office/drawing/2010/main" val="0"/>
+              </a:ext>
+            </a:extLst>
+          </a:blip>
+          <a:stretch>
+            <a:fillRect/>
+          </a:stretch>
+        </p:blipFill>
+        <p:spPr>
+          <a:xfrm>
+            <a:off x="3268324" y="2426328"/>
+            <a:ext cx="5655351" cy="4247616"/>
+          </a:xfrm>
+          <a:prstGeom prst="rect">
+            <a:avLst/>
+          </a:prstGeom>
+        </p:spPr>
+      </p:pic>
+    </p:spTree>
+    <p:extLst>
+      <p:ext uri="{BB962C8B-B14F-4D97-AF65-F5344CB8AC3E}">
+        <p14:creationId xmlns:p14="http://schemas.microsoft.com/office/powerpoint/2010/main" val="1153571681"/>
+      </p:ext>
+    </p:extLst>
+  </p:cSld>
+  <p:clrMapOvr>
+    <a:masterClrMapping/>
+  </p:clrMapOvr>
+</p:sld>
+</file>
+
+<file path=ppt/slides/slide23.xml><?xml version="1.0" encoding="utf-8"?>
+<p:sld xmlns:a="http://schemas.openxmlformats.org/drawingml/2006/main" xmlns:r="http://schemas.openxmlformats.org/officeDocument/2006/relationships" xmlns:p="http://schemas.openxmlformats.org/presentationml/2006/main">
+  <p:cSld>
+    <p:spTree>
+      <p:nvGrpSpPr>
+        <p:cNvPr id="1" name=""/>
+        <p:cNvGrpSpPr/>
+        <p:nvPr/>
+      </p:nvGrpSpPr>
+      <p:grpSpPr>
+        <a:xfrm>
+          <a:off x="0" y="0"/>
+          <a:ext cx="0" cy="0"/>
+          <a:chOff x="0" y="0"/>
+          <a:chExt cx="0" cy="0"/>
+        </a:xfrm>
+      </p:grpSpPr>
+      <p:sp>
+        <p:nvSpPr>
+          <p:cNvPr id="2" name="Title 1">
+            <a:extLst>
+              <a:ext uri="{FF2B5EF4-FFF2-40B4-BE49-F238E27FC236}">
+                <a16:creationId xmlns:a16="http://schemas.microsoft.com/office/drawing/2014/main" id="{DD2AEB79-E092-9B3F-A242-7C8998FFD105}"/>
+              </a:ext>
+            </a:extLst>
+          </p:cNvPr>
+          <p:cNvSpPr>
+            <a:spLocks noGrp="1"/>
+          </p:cNvSpPr>
+          <p:nvPr>
+            <p:ph type="title"/>
+          </p:nvPr>
+        </p:nvSpPr>
+        <p:spPr/>
+        <p:txBody>
+          <a:bodyPr/>
+          <a:lstStyle/>
+          <a:p>
+            <a:r>
+              <a:rPr lang="en-US" dirty="0"/>
+              <a:t>Attack v2 Visualization</a:t>
+            </a:r>
+          </a:p>
+        </p:txBody>
+      </p:sp>
+      <p:sp>
+        <p:nvSpPr>
+          <p:cNvPr id="3" name="Content Placeholder 2">
+            <a:extLst>
+              <a:ext uri="{FF2B5EF4-FFF2-40B4-BE49-F238E27FC236}">
+                <a16:creationId xmlns:a16="http://schemas.microsoft.com/office/drawing/2014/main" id="{C08B4FDE-EF92-733D-9832-2576F0B60B9B}"/>
+              </a:ext>
+            </a:extLst>
+          </p:cNvPr>
+          <p:cNvSpPr>
+            <a:spLocks noGrp="1"/>
+          </p:cNvSpPr>
+          <p:nvPr>
+            <p:ph idx="1"/>
+          </p:nvPr>
+        </p:nvSpPr>
+        <p:spPr/>
+        <p:txBody>
+          <a:bodyPr/>
+          <a:lstStyle/>
+          <a:p>
+            <a:r>
+              <a:rPr lang="en-US" dirty="0"/>
+              <a:t>Final main with manual Kernel32.dll parsing and dynamic loading</a:t>
+            </a:r>
+          </a:p>
+        </p:txBody>
+      </p:sp>
+      <p:pic>
+        <p:nvPicPr>
+          <p:cNvPr id="6" name="Picture 5" descr="Text&#10;&#10;Description automatically generated">
+            <a:extLst>
+              <a:ext uri="{FF2B5EF4-FFF2-40B4-BE49-F238E27FC236}">
+                <a16:creationId xmlns:a16="http://schemas.microsoft.com/office/drawing/2014/main" id="{BA4D8846-120F-59C5-AE84-CB3B628FDD26}"/>
+              </a:ext>
+            </a:extLst>
+          </p:cNvPr>
+          <p:cNvPicPr>
+            <a:picLocks noChangeAspect="1"/>
+          </p:cNvPicPr>
+          <p:nvPr/>
+        </p:nvPicPr>
+        <p:blipFill>
+          <a:blip r:embed="rId2">
+            <a:extLst>
+              <a:ext uri="{28A0092B-C50C-407E-A947-70E740481C1C}">
+                <a14:useLocalDpi xmlns:a14="http://schemas.microsoft.com/office/drawing/2010/main" val="0"/>
+              </a:ext>
+            </a:extLst>
+          </a:blip>
+          <a:stretch>
+            <a:fillRect/>
+          </a:stretch>
+        </p:blipFill>
+        <p:spPr>
+          <a:xfrm>
+            <a:off x="2017704" y="2349767"/>
+            <a:ext cx="8156592" cy="4351338"/>
+          </a:xfrm>
+          <a:prstGeom prst="rect">
+            <a:avLst/>
+          </a:prstGeom>
+        </p:spPr>
+      </p:pic>
+    </p:spTree>
+    <p:extLst>
+      <p:ext uri="{BB962C8B-B14F-4D97-AF65-F5344CB8AC3E}">
+        <p14:creationId xmlns:p14="http://schemas.microsoft.com/office/powerpoint/2010/main" val="748810606"/>
+      </p:ext>
+    </p:extLst>
+  </p:cSld>
+  <p:clrMapOvr>
+    <a:masterClrMapping/>
+  </p:clrMapOvr>
+</p:sld>
+</file>
+
+<file path=ppt/slides/slide24.xml><?xml version="1.0" encoding="utf-8"?>
+<p:sld xmlns:a="http://schemas.openxmlformats.org/drawingml/2006/main" xmlns:r="http://schemas.openxmlformats.org/officeDocument/2006/relationships" xmlns:p="http://schemas.openxmlformats.org/presentationml/2006/main">
+  <p:cSld>
+    <p:spTree>
+      <p:nvGrpSpPr>
+        <p:cNvPr id="1" name=""/>
+        <p:cNvGrpSpPr/>
+        <p:nvPr/>
+      </p:nvGrpSpPr>
+      <p:grpSpPr>
+        <a:xfrm>
+          <a:off x="0" y="0"/>
+          <a:ext cx="0" cy="0"/>
+          <a:chOff x="0" y="0"/>
+          <a:chExt cx="0" cy="0"/>
+        </a:xfrm>
+      </p:grpSpPr>
+      <p:sp>
+        <p:nvSpPr>
+          <p:cNvPr id="2" name="Title 1">
+            <a:extLst>
+              <a:ext uri="{FF2B5EF4-FFF2-40B4-BE49-F238E27FC236}">
+                <a16:creationId xmlns:a16="http://schemas.microsoft.com/office/drawing/2014/main" id="{A9ECFAF4-F3C4-89E4-2719-0DE09764B26D}"/>
+              </a:ext>
+            </a:extLst>
+          </p:cNvPr>
+          <p:cNvSpPr>
+            <a:spLocks noGrp="1"/>
+          </p:cNvSpPr>
+          <p:nvPr>
+            <p:ph type="title"/>
+          </p:nvPr>
+        </p:nvSpPr>
+        <p:spPr/>
+        <p:txBody>
+          <a:bodyPr/>
+          <a:lstStyle/>
+          <a:p>
+            <a:r>
+              <a:rPr lang="en-US" dirty="0"/>
+              <a:t>Attack v2 Results</a:t>
+            </a:r>
+          </a:p>
+        </p:txBody>
+      </p:sp>
+      <p:sp>
+        <p:nvSpPr>
+          <p:cNvPr id="3" name="Content Placeholder 2">
+            <a:extLst>
+              <a:ext uri="{FF2B5EF4-FFF2-40B4-BE49-F238E27FC236}">
+                <a16:creationId xmlns:a16="http://schemas.microsoft.com/office/drawing/2014/main" id="{B4B71F73-5C98-BB08-35CA-E0118CE1C665}"/>
+              </a:ext>
+            </a:extLst>
+          </p:cNvPr>
+          <p:cNvSpPr>
+            <a:spLocks noGrp="1"/>
+          </p:cNvSpPr>
+          <p:nvPr>
+            <p:ph idx="1"/>
+          </p:nvPr>
+        </p:nvSpPr>
+        <p:spPr/>
+        <p:txBody>
+          <a:bodyPr/>
+          <a:lstStyle/>
+          <a:p>
+            <a:r>
+              <a:rPr lang="en-US" dirty="0" err="1"/>
+              <a:t>VirusTotal</a:t>
+            </a:r>
+            <a:r>
+              <a:rPr lang="en-US" dirty="0"/>
+              <a:t> of Evade1-0000</a:t>
+            </a:r>
+          </a:p>
+        </p:txBody>
+      </p:sp>
+      <p:pic>
+        <p:nvPicPr>
+          <p:cNvPr id="5" name="Picture 4" descr="Graphical user interface, application&#10;&#10;Description automatically generated">
+            <a:extLst>
+              <a:ext uri="{FF2B5EF4-FFF2-40B4-BE49-F238E27FC236}">
+                <a16:creationId xmlns:a16="http://schemas.microsoft.com/office/drawing/2014/main" id="{97721CE9-A321-09CF-AC8A-6D5AEAC8926D}"/>
+              </a:ext>
+            </a:extLst>
+          </p:cNvPr>
+          <p:cNvPicPr>
+            <a:picLocks noChangeAspect="1"/>
+          </p:cNvPicPr>
+          <p:nvPr/>
+        </p:nvPicPr>
+        <p:blipFill>
+          <a:blip r:embed="rId2">
+            <a:extLst>
+              <a:ext uri="{28A0092B-C50C-407E-A947-70E740481C1C}">
+                <a14:useLocalDpi xmlns:a14="http://schemas.microsoft.com/office/drawing/2010/main" val="0"/>
+              </a:ext>
+            </a:extLst>
+          </a:blip>
+          <a:stretch>
+            <a:fillRect/>
+          </a:stretch>
+        </p:blipFill>
+        <p:spPr>
+          <a:xfrm>
+            <a:off x="2469660" y="2352752"/>
+            <a:ext cx="7252679" cy="4210357"/>
+          </a:xfrm>
+          <a:prstGeom prst="rect">
+            <a:avLst/>
+          </a:prstGeom>
+        </p:spPr>
+      </p:pic>
+    </p:spTree>
+    <p:extLst>
+      <p:ext uri="{BB962C8B-B14F-4D97-AF65-F5344CB8AC3E}">
+        <p14:creationId xmlns:p14="http://schemas.microsoft.com/office/powerpoint/2010/main" val="373806978"/>
+      </p:ext>
+    </p:extLst>
+  </p:cSld>
+  <p:clrMapOvr>
+    <a:masterClrMapping/>
+  </p:clrMapOvr>
+</p:sld>
+</file>
+
+<file path=ppt/slides/slide25.xml><?xml version="1.0" encoding="utf-8"?>
+<p:sld xmlns:a="http://schemas.openxmlformats.org/drawingml/2006/main" xmlns:r="http://schemas.openxmlformats.org/officeDocument/2006/relationships" xmlns:p="http://schemas.openxmlformats.org/presentationml/2006/main">
+  <p:cSld>
+    <p:spTree>
+      <p:nvGrpSpPr>
+        <p:cNvPr id="1" name=""/>
+        <p:cNvGrpSpPr/>
+        <p:nvPr/>
+      </p:nvGrpSpPr>
+      <p:grpSpPr>
+        <a:xfrm>
+          <a:off x="0" y="0"/>
+          <a:ext cx="0" cy="0"/>
+          <a:chOff x="0" y="0"/>
+          <a:chExt cx="0" cy="0"/>
+        </a:xfrm>
+      </p:grpSpPr>
+      <p:sp>
+        <p:nvSpPr>
+          <p:cNvPr id="2" name="Title 1">
+            <a:extLst>
+              <a:ext uri="{FF2B5EF4-FFF2-40B4-BE49-F238E27FC236}">
                 <a16:creationId xmlns:a16="http://schemas.microsoft.com/office/drawing/2014/main" id="{D5F59CE6-091E-B07E-EC9D-4F213E210DC9}"/>
               </a:ext>
             </a:extLst>
@@ -5318,7 +5682,7 @@
 </p:sld>
 </file>
 
-<file path=ppt/slides/slide23.xml><?xml version="1.0" encoding="utf-8"?>
+<file path=ppt/slides/slide26.xml><?xml version="1.0" encoding="utf-8"?>
 <p:sld xmlns:a="http://schemas.openxmlformats.org/drawingml/2006/main" xmlns:r="http://schemas.openxmlformats.org/officeDocument/2006/relationships" xmlns:p="http://schemas.openxmlformats.org/presentationml/2006/main">
   <p:cSld>
     <p:spTree>
@@ -5440,7 +5804,7 @@
 </p:sld>
 </file>
 
-<file path=ppt/slides/slide24.xml><?xml version="1.0" encoding="utf-8"?>
+<file path=ppt/slides/slide27.xml><?xml version="1.0" encoding="utf-8"?>
 <p:sld xmlns:a="http://schemas.openxmlformats.org/drawingml/2006/main" xmlns:r="http://schemas.openxmlformats.org/officeDocument/2006/relationships" xmlns:p="http://schemas.openxmlformats.org/presentationml/2006/main">
   <p:cSld>
     <p:spTree>
@@ -5604,7 +5968,7 @@
 </p:sld>
 </file>
 
-<file path=ppt/slides/slide25.xml><?xml version="1.0" encoding="utf-8"?>
+<file path=ppt/slides/slide28.xml><?xml version="1.0" encoding="utf-8"?>
 <p:sld xmlns:a="http://schemas.openxmlformats.org/drawingml/2006/main" xmlns:r="http://schemas.openxmlformats.org/officeDocument/2006/relationships" xmlns:p="http://schemas.openxmlformats.org/presentationml/2006/main">
   <p:cSld>
     <p:spTree>
@@ -5726,7 +6090,7 @@
 </p:sld>
 </file>
 
-<file path=ppt/slides/slide26.xml><?xml version="1.0" encoding="utf-8"?>
+<file path=ppt/slides/slide29.xml><?xml version="1.0" encoding="utf-8"?>
 <p:sld xmlns:a="http://schemas.openxmlformats.org/drawingml/2006/main" xmlns:r="http://schemas.openxmlformats.org/officeDocument/2006/relationships" xmlns:p="http://schemas.openxmlformats.org/presentationml/2006/main">
   <p:cSld>
     <p:spTree>
@@ -5839,372 +6203,6 @@
     <p:extLst>
       <p:ext uri="{BB962C8B-B14F-4D97-AF65-F5344CB8AC3E}">
         <p14:creationId xmlns:p14="http://schemas.microsoft.com/office/powerpoint/2010/main" val="4056567533"/>
-      </p:ext>
-    </p:extLst>
-  </p:cSld>
-  <p:clrMapOvr>
-    <a:masterClrMapping/>
-  </p:clrMapOvr>
-</p:sld>
-</file>
-
-<file path=ppt/slides/slide27.xml><?xml version="1.0" encoding="utf-8"?>
-<p:sld xmlns:a="http://schemas.openxmlformats.org/drawingml/2006/main" xmlns:r="http://schemas.openxmlformats.org/officeDocument/2006/relationships" xmlns:p="http://schemas.openxmlformats.org/presentationml/2006/main">
-  <p:cSld>
-    <p:spTree>
-      <p:nvGrpSpPr>
-        <p:cNvPr id="1" name=""/>
-        <p:cNvGrpSpPr/>
-        <p:nvPr/>
-      </p:nvGrpSpPr>
-      <p:grpSpPr>
-        <a:xfrm>
-          <a:off x="0" y="0"/>
-          <a:ext cx="0" cy="0"/>
-          <a:chOff x="0" y="0"/>
-          <a:chExt cx="0" cy="0"/>
-        </a:xfrm>
-      </p:grpSpPr>
-      <p:sp>
-        <p:nvSpPr>
-          <p:cNvPr id="2" name="Title 1">
-            <a:extLst>
-              <a:ext uri="{FF2B5EF4-FFF2-40B4-BE49-F238E27FC236}">
-                <a16:creationId xmlns:a16="http://schemas.microsoft.com/office/drawing/2014/main" id="{A8760E82-875C-16EC-0D9B-D896CA7738D9}"/>
-              </a:ext>
-            </a:extLst>
-          </p:cNvPr>
-          <p:cNvSpPr>
-            <a:spLocks noGrp="1"/>
-          </p:cNvSpPr>
-          <p:nvPr>
-            <p:ph type="title"/>
-          </p:nvPr>
-        </p:nvSpPr>
-        <p:spPr/>
-        <p:txBody>
-          <a:bodyPr/>
-          <a:lstStyle/>
-          <a:p>
-            <a:r>
-              <a:rPr lang="en-US" dirty="0"/>
-              <a:t>Attack v3 Visualization</a:t>
-            </a:r>
-          </a:p>
-        </p:txBody>
-      </p:sp>
-      <p:sp>
-        <p:nvSpPr>
-          <p:cNvPr id="3" name="Content Placeholder 2">
-            <a:extLst>
-              <a:ext uri="{FF2B5EF4-FFF2-40B4-BE49-F238E27FC236}">
-                <a16:creationId xmlns:a16="http://schemas.microsoft.com/office/drawing/2014/main" id="{F473A61F-34D6-BBC4-1C92-5CC04B245B5C}"/>
-              </a:ext>
-            </a:extLst>
-          </p:cNvPr>
-          <p:cNvSpPr>
-            <a:spLocks noGrp="1"/>
-          </p:cNvSpPr>
-          <p:nvPr>
-            <p:ph idx="1"/>
-          </p:nvPr>
-        </p:nvSpPr>
-        <p:spPr/>
-        <p:txBody>
-          <a:bodyPr/>
-          <a:lstStyle/>
-          <a:p>
-            <a:r>
-              <a:rPr lang="en-US" dirty="0"/>
-              <a:t>Sandbox environment detection for dynamic analysis evasion (Ch1-3)</a:t>
-            </a:r>
-          </a:p>
-        </p:txBody>
-      </p:sp>
-      <p:pic>
-        <p:nvPicPr>
-          <p:cNvPr id="5" name="Picture 4" descr="Text&#10;&#10;Description automatically generated">
-            <a:extLst>
-              <a:ext uri="{FF2B5EF4-FFF2-40B4-BE49-F238E27FC236}">
-                <a16:creationId xmlns:a16="http://schemas.microsoft.com/office/drawing/2014/main" id="{64441F4A-8CCB-4FDF-A6CC-9E810B18B399}"/>
-              </a:ext>
-            </a:extLst>
-          </p:cNvPr>
-          <p:cNvPicPr>
-            <a:picLocks noChangeAspect="1"/>
-          </p:cNvPicPr>
-          <p:nvPr/>
-        </p:nvPicPr>
-        <p:blipFill>
-          <a:blip r:embed="rId2">
-            <a:extLst>
-              <a:ext uri="{28A0092B-C50C-407E-A947-70E740481C1C}">
-                <a14:useLocalDpi xmlns:a14="http://schemas.microsoft.com/office/drawing/2010/main" val="0"/>
-              </a:ext>
-            </a:extLst>
-          </a:blip>
-          <a:stretch>
-            <a:fillRect/>
-          </a:stretch>
-        </p:blipFill>
-        <p:spPr>
-          <a:xfrm>
-            <a:off x="2934028" y="2356116"/>
-            <a:ext cx="6323943" cy="4304254"/>
-          </a:xfrm>
-          <a:prstGeom prst="rect">
-            <a:avLst/>
-          </a:prstGeom>
-        </p:spPr>
-      </p:pic>
-    </p:spTree>
-    <p:extLst>
-      <p:ext uri="{BB962C8B-B14F-4D97-AF65-F5344CB8AC3E}">
-        <p14:creationId xmlns:p14="http://schemas.microsoft.com/office/powerpoint/2010/main" val="3157536462"/>
-      </p:ext>
-    </p:extLst>
-  </p:cSld>
-  <p:clrMapOvr>
-    <a:masterClrMapping/>
-  </p:clrMapOvr>
-</p:sld>
-</file>
-
-<file path=ppt/slides/slide28.xml><?xml version="1.0" encoding="utf-8"?>
-<p:sld xmlns:a="http://schemas.openxmlformats.org/drawingml/2006/main" xmlns:r="http://schemas.openxmlformats.org/officeDocument/2006/relationships" xmlns:p="http://schemas.openxmlformats.org/presentationml/2006/main">
-  <p:cSld>
-    <p:spTree>
-      <p:nvGrpSpPr>
-        <p:cNvPr id="1" name=""/>
-        <p:cNvGrpSpPr/>
-        <p:nvPr/>
-      </p:nvGrpSpPr>
-      <p:grpSpPr>
-        <a:xfrm>
-          <a:off x="0" y="0"/>
-          <a:ext cx="0" cy="0"/>
-          <a:chOff x="0" y="0"/>
-          <a:chExt cx="0" cy="0"/>
-        </a:xfrm>
-      </p:grpSpPr>
-      <p:sp>
-        <p:nvSpPr>
-          <p:cNvPr id="2" name="Title 1">
-            <a:extLst>
-              <a:ext uri="{FF2B5EF4-FFF2-40B4-BE49-F238E27FC236}">
-                <a16:creationId xmlns:a16="http://schemas.microsoft.com/office/drawing/2014/main" id="{A8760E82-875C-16EC-0D9B-D896CA7738D9}"/>
-              </a:ext>
-            </a:extLst>
-          </p:cNvPr>
-          <p:cNvSpPr>
-            <a:spLocks noGrp="1"/>
-          </p:cNvSpPr>
-          <p:nvPr>
-            <p:ph type="title"/>
-          </p:nvPr>
-        </p:nvSpPr>
-        <p:spPr/>
-        <p:txBody>
-          <a:bodyPr/>
-          <a:lstStyle/>
-          <a:p>
-            <a:r>
-              <a:rPr lang="en-US" dirty="0"/>
-              <a:t>Attack v3 Visualization</a:t>
-            </a:r>
-          </a:p>
-        </p:txBody>
-      </p:sp>
-      <p:sp>
-        <p:nvSpPr>
-          <p:cNvPr id="3" name="Content Placeholder 2">
-            <a:extLst>
-              <a:ext uri="{FF2B5EF4-FFF2-40B4-BE49-F238E27FC236}">
-                <a16:creationId xmlns:a16="http://schemas.microsoft.com/office/drawing/2014/main" id="{F473A61F-34D6-BBC4-1C92-5CC04B245B5C}"/>
-              </a:ext>
-            </a:extLst>
-          </p:cNvPr>
-          <p:cNvSpPr>
-            <a:spLocks noGrp="1"/>
-          </p:cNvSpPr>
-          <p:nvPr>
-            <p:ph idx="1"/>
-          </p:nvPr>
-        </p:nvSpPr>
-        <p:spPr/>
-        <p:txBody>
-          <a:bodyPr/>
-          <a:lstStyle/>
-          <a:p>
-            <a:r>
-              <a:rPr lang="en-US" dirty="0"/>
-              <a:t>Sandbox environment detection for dynamic analysis evasion (Ch4-5)</a:t>
-            </a:r>
-          </a:p>
-        </p:txBody>
-      </p:sp>
-      <p:pic>
-        <p:nvPicPr>
-          <p:cNvPr id="6" name="Picture 5" descr="Text&#10;&#10;Description automatically generated">
-            <a:extLst>
-              <a:ext uri="{FF2B5EF4-FFF2-40B4-BE49-F238E27FC236}">
-                <a16:creationId xmlns:a16="http://schemas.microsoft.com/office/drawing/2014/main" id="{1C85AA8E-037F-AE4F-9D4C-784F4916C55F}"/>
-              </a:ext>
-            </a:extLst>
-          </p:cNvPr>
-          <p:cNvPicPr>
-            <a:picLocks noChangeAspect="1"/>
-          </p:cNvPicPr>
-          <p:nvPr/>
-        </p:nvPicPr>
-        <p:blipFill>
-          <a:blip r:embed="rId2">
-            <a:extLst>
-              <a:ext uri="{28A0092B-C50C-407E-A947-70E740481C1C}">
-                <a14:useLocalDpi xmlns:a14="http://schemas.microsoft.com/office/drawing/2010/main" val="0"/>
-              </a:ext>
-            </a:extLst>
-          </a:blip>
-          <a:stretch>
-            <a:fillRect/>
-          </a:stretch>
-        </p:blipFill>
-        <p:spPr>
-          <a:xfrm>
-            <a:off x="2990416" y="2785590"/>
-            <a:ext cx="6211167" cy="3391373"/>
-          </a:xfrm>
-          <a:prstGeom prst="rect">
-            <a:avLst/>
-          </a:prstGeom>
-        </p:spPr>
-      </p:pic>
-    </p:spTree>
-    <p:extLst>
-      <p:ext uri="{BB962C8B-B14F-4D97-AF65-F5344CB8AC3E}">
-        <p14:creationId xmlns:p14="http://schemas.microsoft.com/office/powerpoint/2010/main" val="3197722010"/>
-      </p:ext>
-    </p:extLst>
-  </p:cSld>
-  <p:clrMapOvr>
-    <a:masterClrMapping/>
-  </p:clrMapOvr>
-</p:sld>
-</file>
-
-<file path=ppt/slides/slide29.xml><?xml version="1.0" encoding="utf-8"?>
-<p:sld xmlns:a="http://schemas.openxmlformats.org/drawingml/2006/main" xmlns:r="http://schemas.openxmlformats.org/officeDocument/2006/relationships" xmlns:p="http://schemas.openxmlformats.org/presentationml/2006/main">
-  <p:cSld>
-    <p:spTree>
-      <p:nvGrpSpPr>
-        <p:cNvPr id="1" name=""/>
-        <p:cNvGrpSpPr/>
-        <p:nvPr/>
-      </p:nvGrpSpPr>
-      <p:grpSpPr>
-        <a:xfrm>
-          <a:off x="0" y="0"/>
-          <a:ext cx="0" cy="0"/>
-          <a:chOff x="0" y="0"/>
-          <a:chExt cx="0" cy="0"/>
-        </a:xfrm>
-      </p:grpSpPr>
-      <p:sp>
-        <p:nvSpPr>
-          <p:cNvPr id="2" name="Title 1">
-            <a:extLst>
-              <a:ext uri="{FF2B5EF4-FFF2-40B4-BE49-F238E27FC236}">
-                <a16:creationId xmlns:a16="http://schemas.microsoft.com/office/drawing/2014/main" id="{527FF680-3EBB-1B0A-9D55-4FC034E8E2B0}"/>
-              </a:ext>
-            </a:extLst>
-          </p:cNvPr>
-          <p:cNvSpPr>
-            <a:spLocks noGrp="1"/>
-          </p:cNvSpPr>
-          <p:nvPr>
-            <p:ph type="title"/>
-          </p:nvPr>
-        </p:nvSpPr>
-        <p:spPr/>
-        <p:txBody>
-          <a:bodyPr/>
-          <a:lstStyle/>
-          <a:p>
-            <a:r>
-              <a:rPr lang="en-US" dirty="0"/>
-              <a:t>Attack v3 Visualization</a:t>
-            </a:r>
-          </a:p>
-        </p:txBody>
-      </p:sp>
-      <p:sp>
-        <p:nvSpPr>
-          <p:cNvPr id="3" name="Content Placeholder 2">
-            <a:extLst>
-              <a:ext uri="{FF2B5EF4-FFF2-40B4-BE49-F238E27FC236}">
-                <a16:creationId xmlns:a16="http://schemas.microsoft.com/office/drawing/2014/main" id="{9E0F23D1-614D-0A70-0B4A-3B2A92C0BF06}"/>
-              </a:ext>
-            </a:extLst>
-          </p:cNvPr>
-          <p:cNvSpPr>
-            <a:spLocks noGrp="1"/>
-          </p:cNvSpPr>
-          <p:nvPr>
-            <p:ph idx="1"/>
-          </p:nvPr>
-        </p:nvSpPr>
-        <p:spPr/>
-        <p:txBody>
-          <a:bodyPr/>
-          <a:lstStyle/>
-          <a:p>
-            <a:r>
-              <a:rPr lang="en-US" dirty="0"/>
-              <a:t>Debugger detection for dynamic analysis evasion </a:t>
-            </a:r>
-          </a:p>
-        </p:txBody>
-      </p:sp>
-      <p:pic>
-        <p:nvPicPr>
-          <p:cNvPr id="5" name="Picture 4" descr="A screenshot of a computer&#10;&#10;Description automatically generated with medium confidence">
-            <a:extLst>
-              <a:ext uri="{FF2B5EF4-FFF2-40B4-BE49-F238E27FC236}">
-                <a16:creationId xmlns:a16="http://schemas.microsoft.com/office/drawing/2014/main" id="{AAD7104A-05E8-1FD0-71D6-26949C367785}"/>
-              </a:ext>
-            </a:extLst>
-          </p:cNvPr>
-          <p:cNvPicPr>
-            <a:picLocks noChangeAspect="1"/>
-          </p:cNvPicPr>
-          <p:nvPr/>
-        </p:nvPicPr>
-        <p:blipFill>
-          <a:blip r:embed="rId2">
-            <a:extLst>
-              <a:ext uri="{28A0092B-C50C-407E-A947-70E740481C1C}">
-                <a14:useLocalDpi xmlns:a14="http://schemas.microsoft.com/office/drawing/2010/main" val="0"/>
-              </a:ext>
-            </a:extLst>
-          </a:blip>
-          <a:stretch>
-            <a:fillRect/>
-          </a:stretch>
-        </p:blipFill>
-        <p:spPr>
-          <a:xfrm>
-            <a:off x="2647468" y="2757669"/>
-            <a:ext cx="6897063" cy="2791215"/>
-          </a:xfrm>
-          <a:prstGeom prst="rect">
-            <a:avLst/>
-          </a:prstGeom>
-        </p:spPr>
-      </p:pic>
-    </p:spTree>
-    <p:extLst>
-      <p:ext uri="{BB962C8B-B14F-4D97-AF65-F5344CB8AC3E}">
-        <p14:creationId xmlns:p14="http://schemas.microsoft.com/office/powerpoint/2010/main" val="1726204676"/>
       </p:ext>
     </p:extLst>
   </p:cSld>
@@ -6422,7 +6420,7 @@
           <p:cNvPr id="2" name="Title 1">
             <a:extLst>
               <a:ext uri="{FF2B5EF4-FFF2-40B4-BE49-F238E27FC236}">
-                <a16:creationId xmlns:a16="http://schemas.microsoft.com/office/drawing/2014/main" id="{BD4BF7B8-0976-DEAB-C293-21A460C964B3}"/>
+                <a16:creationId xmlns:a16="http://schemas.microsoft.com/office/drawing/2014/main" id="{A8760E82-875C-16EC-0D9B-D896CA7738D9}"/>
               </a:ext>
             </a:extLst>
           </p:cNvPr>
@@ -6450,7 +6448,7 @@
           <p:cNvPr id="3" name="Content Placeholder 2">
             <a:extLst>
               <a:ext uri="{FF2B5EF4-FFF2-40B4-BE49-F238E27FC236}">
-                <a16:creationId xmlns:a16="http://schemas.microsoft.com/office/drawing/2014/main" id="{D6F0BD04-DBBE-E598-D459-FCD2F44FC4C3}"/>
+                <a16:creationId xmlns:a16="http://schemas.microsoft.com/office/drawing/2014/main" id="{F473A61F-34D6-BBC4-1C92-5CC04B245B5C}"/>
               </a:ext>
             </a:extLst>
           </p:cNvPr>
@@ -6468,7 +6466,7 @@
           <a:p>
             <a:r>
               <a:rPr lang="en-US" dirty="0"/>
-              <a:t>Final main with 1 minute wait timer to evade dynamic analysis</a:t>
+              <a:t>Sandbox environment detection for dynamic analysis evasion (Ch1-3)</a:t>
             </a:r>
           </a:p>
         </p:txBody>
@@ -6478,7 +6476,7 @@
           <p:cNvPr id="5" name="Picture 4" descr="Text&#10;&#10;Description automatically generated">
             <a:extLst>
               <a:ext uri="{FF2B5EF4-FFF2-40B4-BE49-F238E27FC236}">
-                <a16:creationId xmlns:a16="http://schemas.microsoft.com/office/drawing/2014/main" id="{4F9AE31D-838A-89B1-DD68-021889716DCE}"/>
+                <a16:creationId xmlns:a16="http://schemas.microsoft.com/office/drawing/2014/main" id="{64441F4A-8CCB-4FDF-A6CC-9E810B18B399}"/>
               </a:ext>
             </a:extLst>
           </p:cNvPr>
@@ -6501,8 +6499,374 @@
         </p:blipFill>
         <p:spPr>
           <a:xfrm>
-            <a:off x="2749711" y="2272420"/>
-            <a:ext cx="6692578" cy="4453163"/>
+            <a:off x="2934028" y="2356116"/>
+            <a:ext cx="6323943" cy="4304254"/>
+          </a:xfrm>
+          <a:prstGeom prst="rect">
+            <a:avLst/>
+          </a:prstGeom>
+        </p:spPr>
+      </p:pic>
+    </p:spTree>
+    <p:extLst>
+      <p:ext uri="{BB962C8B-B14F-4D97-AF65-F5344CB8AC3E}">
+        <p14:creationId xmlns:p14="http://schemas.microsoft.com/office/powerpoint/2010/main" val="3157536462"/>
+      </p:ext>
+    </p:extLst>
+  </p:cSld>
+  <p:clrMapOvr>
+    <a:masterClrMapping/>
+  </p:clrMapOvr>
+</p:sld>
+</file>
+
+<file path=ppt/slides/slide31.xml><?xml version="1.0" encoding="utf-8"?>
+<p:sld xmlns:a="http://schemas.openxmlformats.org/drawingml/2006/main" xmlns:r="http://schemas.openxmlformats.org/officeDocument/2006/relationships" xmlns:p="http://schemas.openxmlformats.org/presentationml/2006/main">
+  <p:cSld>
+    <p:spTree>
+      <p:nvGrpSpPr>
+        <p:cNvPr id="1" name=""/>
+        <p:cNvGrpSpPr/>
+        <p:nvPr/>
+      </p:nvGrpSpPr>
+      <p:grpSpPr>
+        <a:xfrm>
+          <a:off x="0" y="0"/>
+          <a:ext cx="0" cy="0"/>
+          <a:chOff x="0" y="0"/>
+          <a:chExt cx="0" cy="0"/>
+        </a:xfrm>
+      </p:grpSpPr>
+      <p:sp>
+        <p:nvSpPr>
+          <p:cNvPr id="2" name="Title 1">
+            <a:extLst>
+              <a:ext uri="{FF2B5EF4-FFF2-40B4-BE49-F238E27FC236}">
+                <a16:creationId xmlns:a16="http://schemas.microsoft.com/office/drawing/2014/main" id="{A8760E82-875C-16EC-0D9B-D896CA7738D9}"/>
+              </a:ext>
+            </a:extLst>
+          </p:cNvPr>
+          <p:cNvSpPr>
+            <a:spLocks noGrp="1"/>
+          </p:cNvSpPr>
+          <p:nvPr>
+            <p:ph type="title"/>
+          </p:nvPr>
+        </p:nvSpPr>
+        <p:spPr/>
+        <p:txBody>
+          <a:bodyPr/>
+          <a:lstStyle/>
+          <a:p>
+            <a:r>
+              <a:rPr lang="en-US" dirty="0"/>
+              <a:t>Attack v3 Visualization</a:t>
+            </a:r>
+          </a:p>
+        </p:txBody>
+      </p:sp>
+      <p:sp>
+        <p:nvSpPr>
+          <p:cNvPr id="3" name="Content Placeholder 2">
+            <a:extLst>
+              <a:ext uri="{FF2B5EF4-FFF2-40B4-BE49-F238E27FC236}">
+                <a16:creationId xmlns:a16="http://schemas.microsoft.com/office/drawing/2014/main" id="{F473A61F-34D6-BBC4-1C92-5CC04B245B5C}"/>
+              </a:ext>
+            </a:extLst>
+          </p:cNvPr>
+          <p:cNvSpPr>
+            <a:spLocks noGrp="1"/>
+          </p:cNvSpPr>
+          <p:nvPr>
+            <p:ph idx="1"/>
+          </p:nvPr>
+        </p:nvSpPr>
+        <p:spPr/>
+        <p:txBody>
+          <a:bodyPr/>
+          <a:lstStyle/>
+          <a:p>
+            <a:r>
+              <a:rPr lang="en-US" dirty="0"/>
+              <a:t>Sandbox environment detection for dynamic analysis evasion (Ch4-5)</a:t>
+            </a:r>
+          </a:p>
+        </p:txBody>
+      </p:sp>
+      <p:pic>
+        <p:nvPicPr>
+          <p:cNvPr id="6" name="Picture 5" descr="Text&#10;&#10;Description automatically generated">
+            <a:extLst>
+              <a:ext uri="{FF2B5EF4-FFF2-40B4-BE49-F238E27FC236}">
+                <a16:creationId xmlns:a16="http://schemas.microsoft.com/office/drawing/2014/main" id="{1C85AA8E-037F-AE4F-9D4C-784F4916C55F}"/>
+              </a:ext>
+            </a:extLst>
+          </p:cNvPr>
+          <p:cNvPicPr>
+            <a:picLocks noChangeAspect="1"/>
+          </p:cNvPicPr>
+          <p:nvPr/>
+        </p:nvPicPr>
+        <p:blipFill>
+          <a:blip r:embed="rId2">
+            <a:extLst>
+              <a:ext uri="{28A0092B-C50C-407E-A947-70E740481C1C}">
+                <a14:useLocalDpi xmlns:a14="http://schemas.microsoft.com/office/drawing/2010/main" val="0"/>
+              </a:ext>
+            </a:extLst>
+          </a:blip>
+          <a:stretch>
+            <a:fillRect/>
+          </a:stretch>
+        </p:blipFill>
+        <p:spPr>
+          <a:xfrm>
+            <a:off x="2990416" y="2785590"/>
+            <a:ext cx="6211167" cy="3391373"/>
+          </a:xfrm>
+          <a:prstGeom prst="rect">
+            <a:avLst/>
+          </a:prstGeom>
+        </p:spPr>
+      </p:pic>
+    </p:spTree>
+    <p:extLst>
+      <p:ext uri="{BB962C8B-B14F-4D97-AF65-F5344CB8AC3E}">
+        <p14:creationId xmlns:p14="http://schemas.microsoft.com/office/powerpoint/2010/main" val="3197722010"/>
+      </p:ext>
+    </p:extLst>
+  </p:cSld>
+  <p:clrMapOvr>
+    <a:masterClrMapping/>
+  </p:clrMapOvr>
+</p:sld>
+</file>
+
+<file path=ppt/slides/slide32.xml><?xml version="1.0" encoding="utf-8"?>
+<p:sld xmlns:a="http://schemas.openxmlformats.org/drawingml/2006/main" xmlns:r="http://schemas.openxmlformats.org/officeDocument/2006/relationships" xmlns:p="http://schemas.openxmlformats.org/presentationml/2006/main">
+  <p:cSld>
+    <p:spTree>
+      <p:nvGrpSpPr>
+        <p:cNvPr id="1" name=""/>
+        <p:cNvGrpSpPr/>
+        <p:nvPr/>
+      </p:nvGrpSpPr>
+      <p:grpSpPr>
+        <a:xfrm>
+          <a:off x="0" y="0"/>
+          <a:ext cx="0" cy="0"/>
+          <a:chOff x="0" y="0"/>
+          <a:chExt cx="0" cy="0"/>
+        </a:xfrm>
+      </p:grpSpPr>
+      <p:sp>
+        <p:nvSpPr>
+          <p:cNvPr id="2" name="Title 1">
+            <a:extLst>
+              <a:ext uri="{FF2B5EF4-FFF2-40B4-BE49-F238E27FC236}">
+                <a16:creationId xmlns:a16="http://schemas.microsoft.com/office/drawing/2014/main" id="{527FF680-3EBB-1B0A-9D55-4FC034E8E2B0}"/>
+              </a:ext>
+            </a:extLst>
+          </p:cNvPr>
+          <p:cNvSpPr>
+            <a:spLocks noGrp="1"/>
+          </p:cNvSpPr>
+          <p:nvPr>
+            <p:ph type="title"/>
+          </p:nvPr>
+        </p:nvSpPr>
+        <p:spPr/>
+        <p:txBody>
+          <a:bodyPr/>
+          <a:lstStyle/>
+          <a:p>
+            <a:r>
+              <a:rPr lang="en-US" dirty="0"/>
+              <a:t>Attack v3 Visualization</a:t>
+            </a:r>
+          </a:p>
+        </p:txBody>
+      </p:sp>
+      <p:sp>
+        <p:nvSpPr>
+          <p:cNvPr id="3" name="Content Placeholder 2">
+            <a:extLst>
+              <a:ext uri="{FF2B5EF4-FFF2-40B4-BE49-F238E27FC236}">
+                <a16:creationId xmlns:a16="http://schemas.microsoft.com/office/drawing/2014/main" id="{9E0F23D1-614D-0A70-0B4A-3B2A92C0BF06}"/>
+              </a:ext>
+            </a:extLst>
+          </p:cNvPr>
+          <p:cNvSpPr>
+            <a:spLocks noGrp="1"/>
+          </p:cNvSpPr>
+          <p:nvPr>
+            <p:ph idx="1"/>
+          </p:nvPr>
+        </p:nvSpPr>
+        <p:spPr/>
+        <p:txBody>
+          <a:bodyPr/>
+          <a:lstStyle/>
+          <a:p>
+            <a:r>
+              <a:rPr lang="en-US" dirty="0"/>
+              <a:t>Debugger detection for dynamic analysis evasion </a:t>
+            </a:r>
+          </a:p>
+        </p:txBody>
+      </p:sp>
+      <p:pic>
+        <p:nvPicPr>
+          <p:cNvPr id="5" name="Picture 4" descr="A screenshot of a computer&#10;&#10;Description automatically generated with medium confidence">
+            <a:extLst>
+              <a:ext uri="{FF2B5EF4-FFF2-40B4-BE49-F238E27FC236}">
+                <a16:creationId xmlns:a16="http://schemas.microsoft.com/office/drawing/2014/main" id="{AAD7104A-05E8-1FD0-71D6-26949C367785}"/>
+              </a:ext>
+            </a:extLst>
+          </p:cNvPr>
+          <p:cNvPicPr>
+            <a:picLocks noChangeAspect="1"/>
+          </p:cNvPicPr>
+          <p:nvPr/>
+        </p:nvPicPr>
+        <p:blipFill>
+          <a:blip r:embed="rId2">
+            <a:extLst>
+              <a:ext uri="{28A0092B-C50C-407E-A947-70E740481C1C}">
+                <a14:useLocalDpi xmlns:a14="http://schemas.microsoft.com/office/drawing/2010/main" val="0"/>
+              </a:ext>
+            </a:extLst>
+          </a:blip>
+          <a:stretch>
+            <a:fillRect/>
+          </a:stretch>
+        </p:blipFill>
+        <p:spPr>
+          <a:xfrm>
+            <a:off x="2647468" y="2757669"/>
+            <a:ext cx="6897063" cy="2791215"/>
+          </a:xfrm>
+          <a:prstGeom prst="rect">
+            <a:avLst/>
+          </a:prstGeom>
+        </p:spPr>
+      </p:pic>
+    </p:spTree>
+    <p:extLst>
+      <p:ext uri="{BB962C8B-B14F-4D97-AF65-F5344CB8AC3E}">
+        <p14:creationId xmlns:p14="http://schemas.microsoft.com/office/powerpoint/2010/main" val="1726204676"/>
+      </p:ext>
+    </p:extLst>
+  </p:cSld>
+  <p:clrMapOvr>
+    <a:masterClrMapping/>
+  </p:clrMapOvr>
+</p:sld>
+</file>
+
+<file path=ppt/slides/slide33.xml><?xml version="1.0" encoding="utf-8"?>
+<p:sld xmlns:a="http://schemas.openxmlformats.org/drawingml/2006/main" xmlns:r="http://schemas.openxmlformats.org/officeDocument/2006/relationships" xmlns:p="http://schemas.openxmlformats.org/presentationml/2006/main">
+  <p:cSld>
+    <p:spTree>
+      <p:nvGrpSpPr>
+        <p:cNvPr id="1" name=""/>
+        <p:cNvGrpSpPr/>
+        <p:nvPr/>
+      </p:nvGrpSpPr>
+      <p:grpSpPr>
+        <a:xfrm>
+          <a:off x="0" y="0"/>
+          <a:ext cx="0" cy="0"/>
+          <a:chOff x="0" y="0"/>
+          <a:chExt cx="0" cy="0"/>
+        </a:xfrm>
+      </p:grpSpPr>
+      <p:sp>
+        <p:nvSpPr>
+          <p:cNvPr id="2" name="Title 1">
+            <a:extLst>
+              <a:ext uri="{FF2B5EF4-FFF2-40B4-BE49-F238E27FC236}">
+                <a16:creationId xmlns:a16="http://schemas.microsoft.com/office/drawing/2014/main" id="{BD4BF7B8-0976-DEAB-C293-21A460C964B3}"/>
+              </a:ext>
+            </a:extLst>
+          </p:cNvPr>
+          <p:cNvSpPr>
+            <a:spLocks noGrp="1"/>
+          </p:cNvSpPr>
+          <p:nvPr>
+            <p:ph type="title"/>
+          </p:nvPr>
+        </p:nvSpPr>
+        <p:spPr/>
+        <p:txBody>
+          <a:bodyPr/>
+          <a:lstStyle/>
+          <a:p>
+            <a:r>
+              <a:rPr lang="en-US" dirty="0"/>
+              <a:t>Attack v3 Visualization</a:t>
+            </a:r>
+          </a:p>
+        </p:txBody>
+      </p:sp>
+      <p:sp>
+        <p:nvSpPr>
+          <p:cNvPr id="3" name="Content Placeholder 2">
+            <a:extLst>
+              <a:ext uri="{FF2B5EF4-FFF2-40B4-BE49-F238E27FC236}">
+                <a16:creationId xmlns:a16="http://schemas.microsoft.com/office/drawing/2014/main" id="{D6F0BD04-DBBE-E598-D459-FCD2F44FC4C3}"/>
+              </a:ext>
+            </a:extLst>
+          </p:cNvPr>
+          <p:cNvSpPr>
+            <a:spLocks noGrp="1"/>
+          </p:cNvSpPr>
+          <p:nvPr>
+            <p:ph idx="1"/>
+          </p:nvPr>
+        </p:nvSpPr>
+        <p:spPr/>
+        <p:txBody>
+          <a:bodyPr/>
+          <a:lstStyle/>
+          <a:p>
+            <a:r>
+              <a:rPr lang="en-US" dirty="0"/>
+              <a:t>Final main with 1 minute wait timer to evade dynamic analysis</a:t>
+            </a:r>
+          </a:p>
+        </p:txBody>
+      </p:sp>
+      <p:pic>
+        <p:nvPicPr>
+          <p:cNvPr id="6" name="Picture 5" descr="Text&#10;&#10;Description automatically generated">
+            <a:extLst>
+              <a:ext uri="{FF2B5EF4-FFF2-40B4-BE49-F238E27FC236}">
+                <a16:creationId xmlns:a16="http://schemas.microsoft.com/office/drawing/2014/main" id="{DA8E47B0-0975-F256-4589-EA4EF6564727}"/>
+              </a:ext>
+            </a:extLst>
+          </p:cNvPr>
+          <p:cNvPicPr>
+            <a:picLocks noChangeAspect="1"/>
+          </p:cNvPicPr>
+          <p:nvPr/>
+        </p:nvPicPr>
+        <p:blipFill>
+          <a:blip r:embed="rId2">
+            <a:extLst>
+              <a:ext uri="{28A0092B-C50C-407E-A947-70E740481C1C}">
+                <a14:useLocalDpi xmlns:a14="http://schemas.microsoft.com/office/drawing/2010/main" val="0"/>
+              </a:ext>
+            </a:extLst>
+          </a:blip>
+          <a:stretch>
+            <a:fillRect/>
+          </a:stretch>
+        </p:blipFill>
+        <p:spPr>
+          <a:xfrm>
+            <a:off x="2683543" y="2254312"/>
+            <a:ext cx="6824914" cy="4521054"/>
           </a:xfrm>
           <a:prstGeom prst="rect">
             <a:avLst/>
@@ -6522,7 +6886,7 @@
 </p:sld>
 </file>
 
-<file path=ppt/slides/slide31.xml><?xml version="1.0" encoding="utf-8"?>
+<file path=ppt/slides/slide34.xml><?xml version="1.0" encoding="utf-8"?>
 <p:sld xmlns:a="http://schemas.openxmlformats.org/drawingml/2006/main" xmlns:r="http://schemas.openxmlformats.org/officeDocument/2006/relationships" xmlns:p="http://schemas.openxmlformats.org/presentationml/2006/main">
   <p:cSld>
     <p:spTree>
@@ -6659,7 +7023,7 @@
 </p:sld>
 </file>
 
-<file path=ppt/slides/slide32.xml><?xml version="1.0" encoding="utf-8"?>
+<file path=ppt/slides/slide35.xml><?xml version="1.0" encoding="utf-8"?>
 <p:sld xmlns:a="http://schemas.openxmlformats.org/drawingml/2006/main" xmlns:r="http://schemas.openxmlformats.org/officeDocument/2006/relationships" xmlns:p="http://schemas.openxmlformats.org/presentationml/2006/main">
   <p:cSld>
     <p:spTree>
@@ -6792,7 +7156,7 @@
 </p:sld>
 </file>
 
-<file path=ppt/slides/slide33.xml><?xml version="1.0" encoding="utf-8"?>
+<file path=ppt/slides/slide36.xml><?xml version="1.0" encoding="utf-8"?>
 <p:sld xmlns:a="http://schemas.openxmlformats.org/drawingml/2006/main" xmlns:r="http://schemas.openxmlformats.org/officeDocument/2006/relationships" xmlns:p="http://schemas.openxmlformats.org/presentationml/2006/main">
   <p:cSld>
     <p:spTree>
@@ -6814,7 +7178,7 @@
           <p:cNvPr id="2" name="Title 1">
             <a:extLst>
               <a:ext uri="{FF2B5EF4-FFF2-40B4-BE49-F238E27FC236}">
-                <a16:creationId xmlns:a16="http://schemas.microsoft.com/office/drawing/2014/main" id="{43FDD31E-DCC2-AFC2-013E-6A48E1E30BB5}"/>
+                <a16:creationId xmlns:a16="http://schemas.microsoft.com/office/drawing/2014/main" id="{A68DF05E-4FD7-0ED6-41F9-239BE6E0D699}"/>
               </a:ext>
             </a:extLst>
           </p:cNvPr>
@@ -6825,52 +7189,58 @@
             <p:ph type="title"/>
           </p:nvPr>
         </p:nvSpPr>
+        <p:spPr/>
+        <p:txBody>
+          <a:bodyPr/>
+          <a:lstStyle/>
+          <a:p>
+            <a:r>
+              <a:rPr lang="en-US"/>
+              <a:t>Additional Tools – VS Ease of Use</a:t>
+            </a:r>
+            <a:endParaRPr lang="en-US" dirty="0"/>
+          </a:p>
+        </p:txBody>
+      </p:sp>
+      <p:pic>
+        <p:nvPicPr>
+          <p:cNvPr id="10" name="Content Placeholder 9" descr="A screenshot of a computer&#10;&#10;Description automatically generated">
+            <a:extLst>
+              <a:ext uri="{FF2B5EF4-FFF2-40B4-BE49-F238E27FC236}">
+                <a16:creationId xmlns:a16="http://schemas.microsoft.com/office/drawing/2014/main" id="{521E2D1A-D4D5-FB11-8878-764FA0120E03}"/>
+              </a:ext>
+            </a:extLst>
+          </p:cNvPr>
+          <p:cNvPicPr>
+            <a:picLocks noGrp="1" noChangeAspect="1"/>
+          </p:cNvPicPr>
+          <p:nvPr>
+            <p:ph idx="1"/>
+          </p:nvPr>
+        </p:nvPicPr>
+        <p:blipFill>
+          <a:blip r:embed="rId2">
+            <a:extLst>
+              <a:ext uri="{28A0092B-C50C-407E-A947-70E740481C1C}">
+                <a14:useLocalDpi xmlns:a14="http://schemas.microsoft.com/office/drawing/2010/main" val="0"/>
+              </a:ext>
+            </a:extLst>
+          </a:blip>
+          <a:stretch>
+            <a:fillRect/>
+          </a:stretch>
+        </p:blipFill>
         <p:spPr>
           <a:xfrm>
-            <a:off x="838200" y="365125"/>
-            <a:ext cx="10704968" cy="1325563"/>
+            <a:off x="2801415" y="1825625"/>
+            <a:ext cx="6589169" cy="4351338"/>
           </a:xfrm>
         </p:spPr>
-        <p:txBody>
-          <a:bodyPr/>
-          <a:lstStyle/>
-          <a:p>
-            <a:r>
-              <a:rPr lang="en-US" dirty="0"/>
-              <a:t>Additional Tools – Creating Encoded Resources</a:t>
-            </a:r>
-          </a:p>
-        </p:txBody>
-      </p:sp>
-      <p:sp>
-        <p:nvSpPr>
-          <p:cNvPr id="3" name="Content Placeholder 2">
-            <a:extLst>
-              <a:ext uri="{FF2B5EF4-FFF2-40B4-BE49-F238E27FC236}">
-                <a16:creationId xmlns:a16="http://schemas.microsoft.com/office/drawing/2014/main" id="{AF692A05-AB8A-7B1F-FACA-19004ED732DA}"/>
-              </a:ext>
-            </a:extLst>
-          </p:cNvPr>
-          <p:cNvSpPr>
-            <a:spLocks noGrp="1"/>
-          </p:cNvSpPr>
-          <p:nvPr>
-            <p:ph idx="1"/>
-          </p:nvPr>
-        </p:nvSpPr>
-        <p:spPr/>
-        <p:txBody>
-          <a:bodyPr/>
-          <a:lstStyle/>
-          <a:p>
-            <a:endParaRPr lang="en-US" dirty="0"/>
-          </a:p>
-        </p:txBody>
-      </p:sp>
+      </p:pic>
     </p:spTree>
     <p:extLst>
       <p:ext uri="{BB962C8B-B14F-4D97-AF65-F5344CB8AC3E}">
-        <p14:creationId xmlns:p14="http://schemas.microsoft.com/office/powerpoint/2010/main" val="3325892076"/>
+        <p14:creationId xmlns:p14="http://schemas.microsoft.com/office/powerpoint/2010/main" val="3918780421"/>
       </p:ext>
     </p:extLst>
   </p:cSld>
@@ -6880,7 +7250,7 @@
 </p:sld>
 </file>
 
-<file path=ppt/slides/slide34.xml><?xml version="1.0" encoding="utf-8"?>
+<file path=ppt/slides/slide37.xml><?xml version="1.0" encoding="utf-8"?>
 <p:sld xmlns:a="http://schemas.openxmlformats.org/drawingml/2006/main" xmlns:r="http://schemas.openxmlformats.org/officeDocument/2006/relationships" xmlns:p="http://schemas.openxmlformats.org/presentationml/2006/main">
   <p:cSld>
     <p:spTree>
@@ -6902,7 +7272,7 @@
           <p:cNvPr id="2" name="Title 1">
             <a:extLst>
               <a:ext uri="{FF2B5EF4-FFF2-40B4-BE49-F238E27FC236}">
-                <a16:creationId xmlns:a16="http://schemas.microsoft.com/office/drawing/2014/main" id="{25F0A3C7-6F3B-40C5-0FEE-E15B04A59F83}"/>
+                <a16:creationId xmlns:a16="http://schemas.microsoft.com/office/drawing/2014/main" id="{43FDD31E-DCC2-AFC2-013E-6A48E1E30BB5}"/>
               </a:ext>
             </a:extLst>
           </p:cNvPr>
@@ -6913,29 +7283,34 @@
             <p:ph type="title"/>
           </p:nvPr>
         </p:nvSpPr>
-        <p:spPr/>
-        <p:txBody>
-          <a:bodyPr/>
-          <a:lstStyle/>
-          <a:p>
-            <a:r>
-              <a:rPr lang="en-US" dirty="0"/>
-              <a:t>Additional Tools – Creating ROT1 int Arrays</a:t>
+        <p:spPr>
+          <a:xfrm>
+            <a:off x="838200" y="365125"/>
+            <a:ext cx="10704968" cy="1325563"/>
+          </a:xfrm>
+        </p:spPr>
+        <p:txBody>
+          <a:bodyPr/>
+          <a:lstStyle/>
+          <a:p>
+            <a:r>
+              <a:rPr lang="en-US" dirty="0"/>
+              <a:t>Additional Tools – Creating Encoded Resources</a:t>
             </a:r>
           </a:p>
         </p:txBody>
       </p:sp>
       <p:pic>
         <p:nvPicPr>
-          <p:cNvPr id="8194" name="Picture 2">
-            <a:extLst>
-              <a:ext uri="{FF2B5EF4-FFF2-40B4-BE49-F238E27FC236}">
-                <a16:creationId xmlns:a16="http://schemas.microsoft.com/office/drawing/2014/main" id="{8A9AA135-7805-E79C-B149-7C5B228BCFF3}"/>
+          <p:cNvPr id="7" name="Content Placeholder 6" descr="Text&#10;&#10;Description automatically generated">
+            <a:extLst>
+              <a:ext uri="{FF2B5EF4-FFF2-40B4-BE49-F238E27FC236}">
+                <a16:creationId xmlns:a16="http://schemas.microsoft.com/office/drawing/2014/main" id="{8E7E62CD-F547-52FC-8521-A670523C8922}"/>
               </a:ext>
             </a:extLst>
           </p:cNvPr>
           <p:cNvPicPr>
-            <a:picLocks noGrp="1" noChangeAspect="1" noChangeArrowheads="1"/>
+            <a:picLocks noGrp="1" noChangeAspect="1"/>
           </p:cNvPicPr>
           <p:nvPr>
             <p:ph idx="1"/>
@@ -6949,31 +7324,75 @@
               </a:ext>
             </a:extLst>
           </a:blip>
-          <a:srcRect/>
           <a:stretch>
             <a:fillRect/>
           </a:stretch>
         </p:blipFill>
-        <p:spPr bwMode="auto">
+        <p:spPr>
           <a:xfrm>
-            <a:off x="1058333" y="2489200"/>
-            <a:ext cx="5250653" cy="3177381"/>
+            <a:off x="3986260" y="1825625"/>
+            <a:ext cx="4219479" cy="4351338"/>
           </a:xfrm>
-          <a:prstGeom prst="rect">
-            <a:avLst/>
-          </a:prstGeom>
-          <a:noFill/>
-          <a:extLst>
-            <a:ext uri="{909E8E84-426E-40DD-AFC4-6F175D3DCCD1}">
-              <a14:hiddenFill xmlns:a14="http://schemas.microsoft.com/office/drawing/2010/main">
-                <a:solidFill>
-                  <a:srgbClr val="FFFFFF"/>
-                </a:solidFill>
-              </a14:hiddenFill>
-            </a:ext>
-          </a:extLst>
         </p:spPr>
       </p:pic>
+    </p:spTree>
+    <p:extLst>
+      <p:ext uri="{BB962C8B-B14F-4D97-AF65-F5344CB8AC3E}">
+        <p14:creationId xmlns:p14="http://schemas.microsoft.com/office/powerpoint/2010/main" val="3325892076"/>
+      </p:ext>
+    </p:extLst>
+  </p:cSld>
+  <p:clrMapOvr>
+    <a:masterClrMapping/>
+  </p:clrMapOvr>
+</p:sld>
+</file>
+
+<file path=ppt/slides/slide38.xml><?xml version="1.0" encoding="utf-8"?>
+<p:sld xmlns:a="http://schemas.openxmlformats.org/drawingml/2006/main" xmlns:r="http://schemas.openxmlformats.org/officeDocument/2006/relationships" xmlns:p="http://schemas.openxmlformats.org/presentationml/2006/main">
+  <p:cSld>
+    <p:spTree>
+      <p:nvGrpSpPr>
+        <p:cNvPr id="1" name=""/>
+        <p:cNvGrpSpPr/>
+        <p:nvPr/>
+      </p:nvGrpSpPr>
+      <p:grpSpPr>
+        <a:xfrm>
+          <a:off x="0" y="0"/>
+          <a:ext cx="0" cy="0"/>
+          <a:chOff x="0" y="0"/>
+          <a:chExt cx="0" cy="0"/>
+        </a:xfrm>
+      </p:grpSpPr>
+      <p:sp>
+        <p:nvSpPr>
+          <p:cNvPr id="2" name="Title 1">
+            <a:extLst>
+              <a:ext uri="{FF2B5EF4-FFF2-40B4-BE49-F238E27FC236}">
+                <a16:creationId xmlns:a16="http://schemas.microsoft.com/office/drawing/2014/main" id="{25F0A3C7-6F3B-40C5-0FEE-E15B04A59F83}"/>
+              </a:ext>
+            </a:extLst>
+          </p:cNvPr>
+          <p:cNvSpPr>
+            <a:spLocks noGrp="1"/>
+          </p:cNvSpPr>
+          <p:nvPr>
+            <p:ph type="title"/>
+          </p:nvPr>
+        </p:nvSpPr>
+        <p:spPr/>
+        <p:txBody>
+          <a:bodyPr/>
+          <a:lstStyle/>
+          <a:p>
+            <a:r>
+              <a:rPr lang="en-US" dirty="0"/>
+              <a:t>Additional Tools – Creating ROT1 int Arrays</a:t>
+            </a:r>
+          </a:p>
+        </p:txBody>
+      </p:sp>
       <p:pic>
         <p:nvPicPr>
           <p:cNvPr id="4" name="Picture 2">
@@ -6989,7 +7408,7 @@
           <p:nvPr/>
         </p:nvPicPr>
         <p:blipFill>
-          <a:blip r:embed="rId3">
+          <a:blip r:embed="rId2">
             <a:extLst>
               <a:ext uri="{28A0092B-C50C-407E-A947-70E740481C1C}">
                 <a14:useLocalDpi xmlns:a14="http://schemas.microsoft.com/office/drawing/2010/main" val="0"/>
@@ -7021,10 +7440,294 @@
           </a:extLst>
         </p:spPr>
       </p:pic>
+      <p:pic>
+        <p:nvPicPr>
+          <p:cNvPr id="6" name="Content Placeholder 5" descr="Text&#10;&#10;Description automatically generated">
+            <a:extLst>
+              <a:ext uri="{FF2B5EF4-FFF2-40B4-BE49-F238E27FC236}">
+                <a16:creationId xmlns:a16="http://schemas.microsoft.com/office/drawing/2014/main" id="{84C95107-F8B4-EB82-395C-D2DFE1BADA74}"/>
+              </a:ext>
+            </a:extLst>
+          </p:cNvPr>
+          <p:cNvPicPr>
+            <a:picLocks noGrp="1" noChangeAspect="1"/>
+          </p:cNvPicPr>
+          <p:nvPr>
+            <p:ph idx="1"/>
+          </p:nvPr>
+        </p:nvPicPr>
+        <p:blipFill>
+          <a:blip r:embed="rId3">
+            <a:extLst>
+              <a:ext uri="{28A0092B-C50C-407E-A947-70E740481C1C}">
+                <a14:useLocalDpi xmlns:a14="http://schemas.microsoft.com/office/drawing/2010/main" val="0"/>
+              </a:ext>
+            </a:extLst>
+          </a:blip>
+          <a:stretch>
+            <a:fillRect/>
+          </a:stretch>
+        </p:blipFill>
+        <p:spPr>
+          <a:xfrm>
+            <a:off x="1386115" y="2203472"/>
+            <a:ext cx="4305901" cy="3477110"/>
+          </a:xfrm>
+        </p:spPr>
+      </p:pic>
     </p:spTree>
     <p:extLst>
       <p:ext uri="{BB962C8B-B14F-4D97-AF65-F5344CB8AC3E}">
         <p14:creationId xmlns:p14="http://schemas.microsoft.com/office/powerpoint/2010/main" val="3883530197"/>
+      </p:ext>
+    </p:extLst>
+  </p:cSld>
+  <p:clrMapOvr>
+    <a:masterClrMapping/>
+  </p:clrMapOvr>
+</p:sld>
+</file>
+
+<file path=ppt/slides/slide39.xml><?xml version="1.0" encoding="utf-8"?>
+<p:sld xmlns:a="http://schemas.openxmlformats.org/drawingml/2006/main" xmlns:r="http://schemas.openxmlformats.org/officeDocument/2006/relationships" xmlns:p="http://schemas.openxmlformats.org/presentationml/2006/main">
+  <p:cSld>
+    <p:spTree>
+      <p:nvGrpSpPr>
+        <p:cNvPr id="1" name=""/>
+        <p:cNvGrpSpPr/>
+        <p:nvPr/>
+      </p:nvGrpSpPr>
+      <p:grpSpPr>
+        <a:xfrm>
+          <a:off x="0" y="0"/>
+          <a:ext cx="0" cy="0"/>
+          <a:chOff x="0" y="0"/>
+          <a:chExt cx="0" cy="0"/>
+        </a:xfrm>
+      </p:grpSpPr>
+      <p:sp>
+        <p:nvSpPr>
+          <p:cNvPr id="2" name="Title 1">
+            <a:extLst>
+              <a:ext uri="{FF2B5EF4-FFF2-40B4-BE49-F238E27FC236}">
+                <a16:creationId xmlns:a16="http://schemas.microsoft.com/office/drawing/2014/main" id="{EACC1DA0-A65D-9CEF-DE10-A36BD19D6758}"/>
+              </a:ext>
+            </a:extLst>
+          </p:cNvPr>
+          <p:cNvSpPr>
+            <a:spLocks noGrp="1"/>
+          </p:cNvSpPr>
+          <p:nvPr>
+            <p:ph type="title"/>
+          </p:nvPr>
+        </p:nvSpPr>
+        <p:spPr/>
+        <p:txBody>
+          <a:bodyPr/>
+          <a:lstStyle/>
+          <a:p>
+            <a:r>
+              <a:rPr lang="en-US" dirty="0"/>
+              <a:t>Future Work</a:t>
+            </a:r>
+          </a:p>
+        </p:txBody>
+      </p:sp>
+      <p:sp>
+        <p:nvSpPr>
+          <p:cNvPr id="3" name="Content Placeholder 2">
+            <a:extLst>
+              <a:ext uri="{FF2B5EF4-FFF2-40B4-BE49-F238E27FC236}">
+                <a16:creationId xmlns:a16="http://schemas.microsoft.com/office/drawing/2014/main" id="{F4AEDCC4-37CC-D237-20DA-D4FCEF328156}"/>
+              </a:ext>
+            </a:extLst>
+          </p:cNvPr>
+          <p:cNvSpPr>
+            <a:spLocks noGrp="1"/>
+          </p:cNvSpPr>
+          <p:nvPr>
+            <p:ph idx="1"/>
+          </p:nvPr>
+        </p:nvSpPr>
+        <p:spPr/>
+        <p:txBody>
+          <a:bodyPr>
+            <a:normAutofit lnSpcReduction="10000"/>
+          </a:bodyPr>
+          <a:lstStyle/>
+          <a:p>
+            <a:r>
+              <a:rPr lang="en-US" dirty="0"/>
+              <a:t>Embed dropper in different file type</a:t>
+            </a:r>
+          </a:p>
+          <a:p>
+            <a:pPr lvl="1"/>
+            <a:r>
+              <a:rPr lang="en-US" dirty="0"/>
+              <a:t>Python executable (auto-</a:t>
+            </a:r>
+            <a:r>
+              <a:rPr lang="en-US" dirty="0" err="1"/>
+              <a:t>py</a:t>
+            </a:r>
+            <a:r>
+              <a:rPr lang="en-US" dirty="0"/>
+              <a:t>-to-exe) [</a:t>
+            </a:r>
+            <a:r>
+              <a:rPr lang="en-US" dirty="0">
+                <a:hlinkClick r:id="rId2"/>
+              </a:rPr>
+              <a:t>1</a:t>
+            </a:r>
+            <a:r>
+              <a:rPr lang="en-US" dirty="0"/>
+              <a:t>] [</a:t>
+            </a:r>
+            <a:r>
+              <a:rPr lang="en-US" dirty="0">
+                <a:hlinkClick r:id="rId3"/>
+              </a:rPr>
+              <a:t>2</a:t>
+            </a:r>
+            <a:r>
+              <a:rPr lang="en-US" dirty="0"/>
+              <a:t>]</a:t>
+            </a:r>
+          </a:p>
+          <a:p>
+            <a:pPr lvl="1"/>
+            <a:r>
+              <a:rPr lang="en-US" dirty="0" err="1"/>
+              <a:t>Excell</a:t>
+            </a:r>
+            <a:r>
+              <a:rPr lang="en-US" dirty="0"/>
+              <a:t> plugin (XLL) [</a:t>
+            </a:r>
+            <a:r>
+              <a:rPr lang="en-US" dirty="0">
+                <a:hlinkClick r:id="rId4"/>
+              </a:rPr>
+              <a:t>1</a:t>
+            </a:r>
+            <a:r>
+              <a:rPr lang="en-US" dirty="0"/>
+              <a:t>] [</a:t>
+            </a:r>
+            <a:r>
+              <a:rPr lang="en-US" dirty="0">
+                <a:hlinkClick r:id="rId5"/>
+              </a:rPr>
+              <a:t>2</a:t>
+            </a:r>
+            <a:r>
+              <a:rPr lang="en-US" dirty="0"/>
+              <a:t>]</a:t>
+            </a:r>
+          </a:p>
+          <a:p>
+            <a:pPr lvl="1"/>
+            <a:endParaRPr lang="en-US" dirty="0"/>
+          </a:p>
+          <a:p>
+            <a:r>
+              <a:rPr lang="en-US" dirty="0"/>
+              <a:t>Incorporate different method to launch process</a:t>
+            </a:r>
+          </a:p>
+          <a:p>
+            <a:pPr lvl="1"/>
+            <a:r>
+              <a:rPr lang="en-US" dirty="0"/>
+              <a:t>Inject into own process then return execution after [</a:t>
+            </a:r>
+            <a:r>
+              <a:rPr lang="en-US" dirty="0">
+                <a:hlinkClick r:id="rId6"/>
+              </a:rPr>
+              <a:t>1</a:t>
+            </a:r>
+            <a:r>
+              <a:rPr lang="en-US" dirty="0"/>
+              <a:t>]</a:t>
+            </a:r>
+          </a:p>
+          <a:p>
+            <a:pPr lvl="1"/>
+            <a:r>
+              <a:rPr lang="en-US" dirty="0"/>
+              <a:t>Doppelg</a:t>
+            </a:r>
+            <a:r>
+              <a:rPr lang="az-Cyrl-AZ" dirty="0"/>
+              <a:t>ӓ</a:t>
+            </a:r>
+            <a:r>
+              <a:rPr lang="en-US" dirty="0"/>
+              <a:t>ng another legitimate process [</a:t>
+            </a:r>
+            <a:r>
+              <a:rPr lang="en-US" dirty="0">
+                <a:hlinkClick r:id="rId7"/>
+              </a:rPr>
+              <a:t>1</a:t>
+            </a:r>
+            <a:r>
+              <a:rPr lang="en-US" dirty="0"/>
+              <a:t>]</a:t>
+            </a:r>
+          </a:p>
+          <a:p>
+            <a:endParaRPr lang="en-US" dirty="0"/>
+          </a:p>
+          <a:p>
+            <a:r>
+              <a:rPr lang="en-US" dirty="0"/>
+              <a:t>Add more sandbox and debugger detection methods</a:t>
+            </a:r>
+          </a:p>
+          <a:p>
+            <a:pPr lvl="1"/>
+            <a:r>
+              <a:rPr lang="en-US" dirty="0"/>
+              <a:t>Wait to execute until after reboot [</a:t>
+            </a:r>
+            <a:r>
+              <a:rPr lang="en-US" dirty="0">
+                <a:hlinkClick r:id="rId8"/>
+              </a:rPr>
+              <a:t>1</a:t>
+            </a:r>
+            <a:r>
+              <a:rPr lang="en-US" dirty="0"/>
+              <a:t>] </a:t>
+            </a:r>
+          </a:p>
+          <a:p>
+            <a:pPr lvl="1"/>
+            <a:r>
+              <a:rPr lang="en-US" dirty="0"/>
+              <a:t>Lock kernel32.dll to prevent analysis programs from using [</a:t>
+            </a:r>
+            <a:r>
+              <a:rPr lang="en-US" dirty="0">
+                <a:hlinkClick r:id="rId9"/>
+              </a:rPr>
+              <a:t>2</a:t>
+            </a:r>
+            <a:r>
+              <a:rPr lang="en-US" dirty="0"/>
+              <a:t>]</a:t>
+            </a:r>
+          </a:p>
+        </p:txBody>
+      </p:sp>
+    </p:spTree>
+    <p:extLst>
+      <p:ext uri="{BB962C8B-B14F-4D97-AF65-F5344CB8AC3E}">
+        <p14:creationId xmlns:p14="http://schemas.microsoft.com/office/powerpoint/2010/main" val="3331146334"/>
       </p:ext>
     </p:extLst>
   </p:cSld>
@@ -7079,31 +7782,41 @@
           </a:p>
         </p:txBody>
       </p:sp>
-      <p:sp>
-        <p:nvSpPr>
-          <p:cNvPr id="3" name="Content Placeholder 2">
-            <a:extLst>
-              <a:ext uri="{FF2B5EF4-FFF2-40B4-BE49-F238E27FC236}">
-                <a16:creationId xmlns:a16="http://schemas.microsoft.com/office/drawing/2014/main" id="{9D118AC6-6D85-C3C2-E653-2FC1561C7EFE}"/>
-              </a:ext>
-            </a:extLst>
-          </p:cNvPr>
-          <p:cNvSpPr>
-            <a:spLocks noGrp="1"/>
-          </p:cNvSpPr>
+      <p:pic>
+        <p:nvPicPr>
+          <p:cNvPr id="5" name="Content Placeholder 4" descr="Graphical user interface, text&#10;&#10;Description automatically generated">
+            <a:extLst>
+              <a:ext uri="{FF2B5EF4-FFF2-40B4-BE49-F238E27FC236}">
+                <a16:creationId xmlns:a16="http://schemas.microsoft.com/office/drawing/2014/main" id="{77CE1661-A486-F827-BDCC-74005543CF10}"/>
+              </a:ext>
+            </a:extLst>
+          </p:cNvPr>
+          <p:cNvPicPr>
+            <a:picLocks noGrp="1" noChangeAspect="1"/>
+          </p:cNvPicPr>
           <p:nvPr>
             <p:ph idx="1"/>
           </p:nvPr>
-        </p:nvSpPr>
-        <p:spPr/>
-        <p:txBody>
-          <a:bodyPr/>
-          <a:lstStyle/>
-          <a:p>
-            <a:endParaRPr lang="en-US"/>
-          </a:p>
-        </p:txBody>
-      </p:sp>
+        </p:nvPicPr>
+        <p:blipFill>
+          <a:blip r:embed="rId2">
+            <a:extLst>
+              <a:ext uri="{28A0092B-C50C-407E-A947-70E740481C1C}">
+                <a14:useLocalDpi xmlns:a14="http://schemas.microsoft.com/office/drawing/2010/main" val="0"/>
+              </a:ext>
+            </a:extLst>
+          </a:blip>
+          <a:stretch>
+            <a:fillRect/>
+          </a:stretch>
+        </p:blipFill>
+        <p:spPr>
+          <a:xfrm>
+            <a:off x="2876502" y="1932869"/>
+            <a:ext cx="6438996" cy="4270071"/>
+          </a:xfrm>
+        </p:spPr>
+      </p:pic>
     </p:spTree>
     <p:extLst>
       <p:ext uri="{BB962C8B-B14F-4D97-AF65-F5344CB8AC3E}">
@@ -7139,7 +7852,7 @@
           <p:cNvPr id="2" name="Title 1">
             <a:extLst>
               <a:ext uri="{FF2B5EF4-FFF2-40B4-BE49-F238E27FC236}">
-                <a16:creationId xmlns:a16="http://schemas.microsoft.com/office/drawing/2014/main" id="{0E04E9B0-DC28-AD6F-AC22-81DBE9E4DF81}"/>
+                <a16:creationId xmlns:a16="http://schemas.microsoft.com/office/drawing/2014/main" id="{4FB198E3-1EDE-0E6D-7A4D-CE66E43E21FD}"/>
               </a:ext>
             </a:extLst>
           </p:cNvPr>
@@ -7157,118 +7870,50 @@
           <a:p>
             <a:r>
               <a:rPr lang="en-US" dirty="0"/>
-              <a:t>Attack v1 Summary</a:t>
-            </a:r>
-          </a:p>
-        </p:txBody>
-      </p:sp>
-      <p:sp>
-        <p:nvSpPr>
-          <p:cNvPr id="3" name="Content Placeholder 2">
-            <a:extLst>
-              <a:ext uri="{FF2B5EF4-FFF2-40B4-BE49-F238E27FC236}">
-                <a16:creationId xmlns:a16="http://schemas.microsoft.com/office/drawing/2014/main" id="{7243B9E0-1B8B-E788-951C-CDE48E5BE931}"/>
-              </a:ext>
-            </a:extLst>
-          </p:cNvPr>
-          <p:cNvSpPr>
-            <a:spLocks noGrp="1"/>
-          </p:cNvSpPr>
+              <a:t>Baseline Attack Visualization</a:t>
+            </a:r>
+          </a:p>
+        </p:txBody>
+      </p:sp>
+      <p:pic>
+        <p:nvPicPr>
+          <p:cNvPr id="5" name="Content Placeholder 4" descr="Text&#10;&#10;Description automatically generated">
+            <a:extLst>
+              <a:ext uri="{FF2B5EF4-FFF2-40B4-BE49-F238E27FC236}">
+                <a16:creationId xmlns:a16="http://schemas.microsoft.com/office/drawing/2014/main" id="{CEAAE44A-E051-B0DB-4A43-55324C0C6D79}"/>
+              </a:ext>
+            </a:extLst>
+          </p:cNvPr>
+          <p:cNvPicPr>
+            <a:picLocks noGrp="1" noChangeAspect="1"/>
+          </p:cNvPicPr>
           <p:nvPr>
             <p:ph idx="1"/>
           </p:nvPr>
-        </p:nvSpPr>
-        <p:spPr/>
-        <p:txBody>
-          <a:bodyPr>
-            <a:normAutofit/>
-          </a:bodyPr>
-          <a:lstStyle/>
-          <a:p>
-            <a:r>
-              <a:rPr lang="en-US" dirty="0"/>
-              <a:t>A list of improvements added:</a:t>
-            </a:r>
-          </a:p>
-          <a:p>
-            <a:pPr marL="914400" lvl="1" indent="-457200">
-              <a:buFont typeface="+mj-lt"/>
-              <a:buAutoNum type="arabicPeriod"/>
-            </a:pPr>
-            <a:r>
-              <a:rPr lang="en-US" dirty="0"/>
-              <a:t>Removed all but 3 static APIs from original attack</a:t>
-            </a:r>
-          </a:p>
-          <a:p>
-            <a:pPr marL="1371600" lvl="2" indent="-457200">
-              <a:buFont typeface="+mj-lt"/>
-              <a:buAutoNum type="romanLcPeriod"/>
-            </a:pPr>
-            <a:r>
-              <a:rPr lang="en-US" dirty="0" err="1"/>
-              <a:t>GetModuleHandleA</a:t>
-            </a:r>
-            <a:endParaRPr lang="en-US" dirty="0"/>
-          </a:p>
-          <a:p>
-            <a:pPr marL="1428750" lvl="2" indent="-514350">
-              <a:buFont typeface="+mj-lt"/>
-              <a:buAutoNum type="romanLcPeriod"/>
-            </a:pPr>
-            <a:r>
-              <a:rPr lang="en-US" dirty="0" err="1"/>
-              <a:t>GetProcAddress</a:t>
-            </a:r>
-            <a:endParaRPr lang="en-US" dirty="0"/>
-          </a:p>
-          <a:p>
-            <a:pPr marL="1428750" lvl="2" indent="-514350">
-              <a:buFont typeface="+mj-lt"/>
-              <a:buAutoNum type="romanLcPeriod"/>
-            </a:pPr>
-            <a:r>
-              <a:rPr lang="en-US" dirty="0" err="1"/>
-              <a:t>LoadLibraryA</a:t>
-            </a:r>
-            <a:endParaRPr lang="en-US" dirty="0"/>
-          </a:p>
-          <a:p>
-            <a:pPr marL="914400" lvl="1" indent="-457200">
-              <a:buFont typeface="+mj-lt"/>
-              <a:buAutoNum type="arabicPeriod"/>
-            </a:pPr>
-            <a:r>
-              <a:rPr lang="en-US" dirty="0"/>
-              <a:t>Replaced original handle reference to Kernel32.dll</a:t>
-            </a:r>
-          </a:p>
-          <a:p>
-            <a:pPr marL="914400" lvl="1" indent="-457200">
-              <a:buFont typeface="+mj-lt"/>
-              <a:buAutoNum type="arabicPeriod"/>
-            </a:pPr>
-            <a:r>
-              <a:rPr lang="en-US" dirty="0"/>
-              <a:t>Further encrypted the int arrays by applying ROT1</a:t>
-            </a:r>
-          </a:p>
-          <a:p>
-            <a:pPr marL="914400" lvl="1" indent="-457200">
-              <a:buFont typeface="+mj-lt"/>
-              <a:buAutoNum type="arabicPeriod"/>
-            </a:pPr>
-            <a:r>
-              <a:rPr lang="en-US" dirty="0"/>
-              <a:t>Implemented manual Base64 decoding</a:t>
-            </a:r>
-          </a:p>
-        </p:txBody>
-      </p:sp>
+        </p:nvPicPr>
+        <p:blipFill>
+          <a:blip r:embed="rId2">
+            <a:extLst>
+              <a:ext uri="{28A0092B-C50C-407E-A947-70E740481C1C}">
+                <a14:useLocalDpi xmlns:a14="http://schemas.microsoft.com/office/drawing/2010/main" val="0"/>
+              </a:ext>
+            </a:extLst>
+          </a:blip>
+          <a:stretch>
+            <a:fillRect/>
+          </a:stretch>
+        </p:blipFill>
+        <p:spPr>
+          <a:xfrm>
+            <a:off x="1814143" y="2507713"/>
+            <a:ext cx="8563714" cy="2650933"/>
+          </a:xfrm>
+        </p:spPr>
+      </p:pic>
     </p:spTree>
     <p:extLst>
       <p:ext uri="{BB962C8B-B14F-4D97-AF65-F5344CB8AC3E}">
-        <p14:creationId xmlns:p14="http://schemas.microsoft.com/office/powerpoint/2010/main" val="2344274572"/>
+        <p14:creationId xmlns:p14="http://schemas.microsoft.com/office/powerpoint/2010/main" val="1939401676"/>
       </p:ext>
     </p:extLst>
   </p:cSld>
@@ -7300,7 +7945,7 @@
           <p:cNvPr id="2" name="Title 1">
             <a:extLst>
               <a:ext uri="{FF2B5EF4-FFF2-40B4-BE49-F238E27FC236}">
-                <a16:creationId xmlns:a16="http://schemas.microsoft.com/office/drawing/2014/main" id="{14D63346-F92A-944A-2575-2BE5B0A79CD3}"/>
+                <a16:creationId xmlns:a16="http://schemas.microsoft.com/office/drawing/2014/main" id="{4FB198E3-1EDE-0E6D-7A4D-CE66E43E21FD}"/>
               </a:ext>
             </a:extLst>
           </p:cNvPr>
@@ -7318,17 +7963,17 @@
           <a:p>
             <a:r>
               <a:rPr lang="en-US" dirty="0"/>
-              <a:t>Attack v1 Visualization</a:t>
+              <a:t>Baseline Attack Visualization</a:t>
             </a:r>
           </a:p>
         </p:txBody>
       </p:sp>
       <p:pic>
         <p:nvPicPr>
-          <p:cNvPr id="7" name="Content Placeholder 6" descr="Graphical user interface, text, chat or text message&#10;&#10;Description automatically generated">
-            <a:extLst>
-              <a:ext uri="{FF2B5EF4-FFF2-40B4-BE49-F238E27FC236}">
-                <a16:creationId xmlns:a16="http://schemas.microsoft.com/office/drawing/2014/main" id="{0F79E74D-E484-C5DC-7335-406892AB7B54}"/>
+          <p:cNvPr id="5" name="Content Placeholder 4" descr="Text&#10;&#10;Description automatically generated">
+            <a:extLst>
+              <a:ext uri="{FF2B5EF4-FFF2-40B4-BE49-F238E27FC236}">
+                <a16:creationId xmlns:a16="http://schemas.microsoft.com/office/drawing/2014/main" id="{9350063E-446A-63AC-024C-7304CBB0772F}"/>
               </a:ext>
             </a:extLst>
           </p:cNvPr>
@@ -7353,15 +7998,15 @@
         </p:blipFill>
         <p:spPr>
           <a:xfrm>
-            <a:off x="3414338" y="2162712"/>
-            <a:ext cx="5363323" cy="3677163"/>
+            <a:off x="1876685" y="2163778"/>
+            <a:ext cx="8438630" cy="3888179"/>
           </a:xfrm>
         </p:spPr>
       </p:pic>
     </p:spTree>
     <p:extLst>
       <p:ext uri="{BB962C8B-B14F-4D97-AF65-F5344CB8AC3E}">
-        <p14:creationId xmlns:p14="http://schemas.microsoft.com/office/powerpoint/2010/main" val="1128754286"/>
+        <p14:creationId xmlns:p14="http://schemas.microsoft.com/office/powerpoint/2010/main" val="1053332559"/>
       </p:ext>
     </p:extLst>
   </p:cSld>
@@ -7393,7 +8038,7 @@
           <p:cNvPr id="2" name="Title 1">
             <a:extLst>
               <a:ext uri="{FF2B5EF4-FFF2-40B4-BE49-F238E27FC236}">
-                <a16:creationId xmlns:a16="http://schemas.microsoft.com/office/drawing/2014/main" id="{14D63346-F92A-944A-2575-2BE5B0A79CD3}"/>
+                <a16:creationId xmlns:a16="http://schemas.microsoft.com/office/drawing/2014/main" id="{4FB198E3-1EDE-0E6D-7A4D-CE66E43E21FD}"/>
               </a:ext>
             </a:extLst>
           </p:cNvPr>
@@ -7411,24 +8056,26 @@
           <a:p>
             <a:r>
               <a:rPr lang="en-US" dirty="0"/>
-              <a:t>Attack v1 Visualization</a:t>
+              <a:t>Baseline Attack Visualization</a:t>
             </a:r>
           </a:p>
         </p:txBody>
       </p:sp>
       <p:pic>
         <p:nvPicPr>
-          <p:cNvPr id="5" name="Picture 4" descr="Text&#10;&#10;Description automatically generated">
-            <a:extLst>
-              <a:ext uri="{FF2B5EF4-FFF2-40B4-BE49-F238E27FC236}">
-                <a16:creationId xmlns:a16="http://schemas.microsoft.com/office/drawing/2014/main" id="{EA83D573-93A7-385F-9C47-C60B05B27694}"/>
+          <p:cNvPr id="17" name="Content Placeholder 16" descr="Text&#10;&#10;Description automatically generated">
+            <a:extLst>
+              <a:ext uri="{FF2B5EF4-FFF2-40B4-BE49-F238E27FC236}">
+                <a16:creationId xmlns:a16="http://schemas.microsoft.com/office/drawing/2014/main" id="{3A9CC05F-6807-FAE8-3884-6573D1EE4CE1}"/>
               </a:ext>
             </a:extLst>
           </p:cNvPr>
           <p:cNvPicPr>
-            <a:picLocks noChangeAspect="1"/>
+            <a:picLocks noGrp="1" noChangeAspect="1"/>
           </p:cNvPicPr>
-          <p:nvPr/>
+          <p:nvPr>
+            <p:ph idx="1"/>
+          </p:nvPr>
         </p:nvPicPr>
         <p:blipFill>
           <a:blip r:embed="rId2">
@@ -7444,8 +8091,41 @@
         </p:blipFill>
         <p:spPr>
           <a:xfrm>
-            <a:off x="2492992" y="1927724"/>
-            <a:ext cx="7206016" cy="3759070"/>
+            <a:off x="995127" y="2267973"/>
+            <a:ext cx="4658375" cy="3448531"/>
+          </a:xfrm>
+        </p:spPr>
+      </p:pic>
+      <p:pic>
+        <p:nvPicPr>
+          <p:cNvPr id="19" name="Picture 18" descr="Text&#10;&#10;Description automatically generated">
+            <a:extLst>
+              <a:ext uri="{FF2B5EF4-FFF2-40B4-BE49-F238E27FC236}">
+                <a16:creationId xmlns:a16="http://schemas.microsoft.com/office/drawing/2014/main" id="{455F27B8-8599-2EF7-D3DD-36FCAAE156FB}"/>
+              </a:ext>
+            </a:extLst>
+          </p:cNvPr>
+          <p:cNvPicPr>
+            <a:picLocks noChangeAspect="1"/>
+          </p:cNvPicPr>
+          <p:nvPr/>
+        </p:nvPicPr>
+        <p:blipFill>
+          <a:blip r:embed="rId3">
+            <a:extLst>
+              <a:ext uri="{28A0092B-C50C-407E-A947-70E740481C1C}">
+                <a14:useLocalDpi xmlns:a14="http://schemas.microsoft.com/office/drawing/2010/main" val="0"/>
+              </a:ext>
+            </a:extLst>
+          </a:blip>
+          <a:stretch>
+            <a:fillRect/>
+          </a:stretch>
+        </p:blipFill>
+        <p:spPr>
+          <a:xfrm>
+            <a:off x="6463730" y="1815473"/>
+            <a:ext cx="4334480" cy="4353533"/>
           </a:xfrm>
           <a:prstGeom prst="rect">
             <a:avLst/>
@@ -7455,7 +8135,7 @@
     </p:spTree>
     <p:extLst>
       <p:ext uri="{BB962C8B-B14F-4D97-AF65-F5344CB8AC3E}">
-        <p14:creationId xmlns:p14="http://schemas.microsoft.com/office/powerpoint/2010/main" val="3766210935"/>
+        <p14:creationId xmlns:p14="http://schemas.microsoft.com/office/powerpoint/2010/main" val="2463179314"/>
       </p:ext>
     </p:extLst>
   </p:cSld>
@@ -7487,7 +8167,7 @@
           <p:cNvPr id="2" name="Title 1">
             <a:extLst>
               <a:ext uri="{FF2B5EF4-FFF2-40B4-BE49-F238E27FC236}">
-                <a16:creationId xmlns:a16="http://schemas.microsoft.com/office/drawing/2014/main" id="{14D63346-F92A-944A-2575-2BE5B0A79CD3}"/>
+                <a16:creationId xmlns:a16="http://schemas.microsoft.com/office/drawing/2014/main" id="{0E04E9B0-DC28-AD6F-AC22-81DBE9E4DF81}"/>
               </a:ext>
             </a:extLst>
           </p:cNvPr>
@@ -7505,51 +8185,118 @@
           <a:p>
             <a:r>
               <a:rPr lang="en-US" dirty="0"/>
-              <a:t>Attack v1 Visualization</a:t>
-            </a:r>
-          </a:p>
-        </p:txBody>
-      </p:sp>
-      <p:pic>
-        <p:nvPicPr>
-          <p:cNvPr id="5" name="Picture 4" descr="Text&#10;&#10;Description automatically generated">
-            <a:extLst>
-              <a:ext uri="{FF2B5EF4-FFF2-40B4-BE49-F238E27FC236}">
-                <a16:creationId xmlns:a16="http://schemas.microsoft.com/office/drawing/2014/main" id="{F409F10A-B260-71CA-01DF-3FF3F5CF9E12}"/>
-              </a:ext>
-            </a:extLst>
-          </p:cNvPr>
-          <p:cNvPicPr>
-            <a:picLocks noChangeAspect="1"/>
-          </p:cNvPicPr>
-          <p:nvPr/>
-        </p:nvPicPr>
-        <p:blipFill>
-          <a:blip r:embed="rId2">
-            <a:extLst>
-              <a:ext uri="{28A0092B-C50C-407E-A947-70E740481C1C}">
-                <a14:useLocalDpi xmlns:a14="http://schemas.microsoft.com/office/drawing/2010/main" val="0"/>
-              </a:ext>
-            </a:extLst>
-          </a:blip>
-          <a:stretch>
-            <a:fillRect/>
-          </a:stretch>
-        </p:blipFill>
-        <p:spPr>
-          <a:xfrm>
-            <a:off x="1599572" y="1899995"/>
-            <a:ext cx="8992855" cy="3477110"/>
-          </a:xfrm>
-          <a:prstGeom prst="rect">
-            <a:avLst/>
-          </a:prstGeom>
-        </p:spPr>
-      </p:pic>
+              <a:t>Attack v1 Summary</a:t>
+            </a:r>
+          </a:p>
+        </p:txBody>
+      </p:sp>
+      <p:sp>
+        <p:nvSpPr>
+          <p:cNvPr id="3" name="Content Placeholder 2">
+            <a:extLst>
+              <a:ext uri="{FF2B5EF4-FFF2-40B4-BE49-F238E27FC236}">
+                <a16:creationId xmlns:a16="http://schemas.microsoft.com/office/drawing/2014/main" id="{7243B9E0-1B8B-E788-951C-CDE48E5BE931}"/>
+              </a:ext>
+            </a:extLst>
+          </p:cNvPr>
+          <p:cNvSpPr>
+            <a:spLocks noGrp="1"/>
+          </p:cNvSpPr>
+          <p:nvPr>
+            <p:ph idx="1"/>
+          </p:nvPr>
+        </p:nvSpPr>
+        <p:spPr/>
+        <p:txBody>
+          <a:bodyPr>
+            <a:normAutofit/>
+          </a:bodyPr>
+          <a:lstStyle/>
+          <a:p>
+            <a:r>
+              <a:rPr lang="en-US" dirty="0"/>
+              <a:t>A list of improvements added:</a:t>
+            </a:r>
+          </a:p>
+          <a:p>
+            <a:pPr marL="914400" lvl="1" indent="-457200">
+              <a:buFont typeface="+mj-lt"/>
+              <a:buAutoNum type="arabicPeriod"/>
+            </a:pPr>
+            <a:r>
+              <a:rPr lang="en-US" dirty="0"/>
+              <a:t>Removed all but 3 static APIs from original attack</a:t>
+            </a:r>
+          </a:p>
+          <a:p>
+            <a:pPr marL="1371600" lvl="2" indent="-457200">
+              <a:buFont typeface="+mj-lt"/>
+              <a:buAutoNum type="romanLcPeriod"/>
+            </a:pPr>
+            <a:r>
+              <a:rPr lang="en-US" dirty="0" err="1"/>
+              <a:t>GetModuleHandleA</a:t>
+            </a:r>
+            <a:endParaRPr lang="en-US" dirty="0"/>
+          </a:p>
+          <a:p>
+            <a:pPr marL="1428750" lvl="2" indent="-514350">
+              <a:buFont typeface="+mj-lt"/>
+              <a:buAutoNum type="romanLcPeriod"/>
+            </a:pPr>
+            <a:r>
+              <a:rPr lang="en-US" dirty="0" err="1"/>
+              <a:t>GetProcAddress</a:t>
+            </a:r>
+            <a:endParaRPr lang="en-US" dirty="0"/>
+          </a:p>
+          <a:p>
+            <a:pPr marL="1428750" lvl="2" indent="-514350">
+              <a:buFont typeface="+mj-lt"/>
+              <a:buAutoNum type="romanLcPeriod"/>
+            </a:pPr>
+            <a:r>
+              <a:rPr lang="en-US" dirty="0" err="1"/>
+              <a:t>LoadLibraryA</a:t>
+            </a:r>
+            <a:endParaRPr lang="en-US" dirty="0"/>
+          </a:p>
+          <a:p>
+            <a:pPr marL="914400" lvl="1" indent="-457200">
+              <a:buFont typeface="+mj-lt"/>
+              <a:buAutoNum type="arabicPeriod"/>
+            </a:pPr>
+            <a:r>
+              <a:rPr lang="en-US" dirty="0"/>
+              <a:t>Replaced original handle reference to Kernel32.dll</a:t>
+            </a:r>
+          </a:p>
+          <a:p>
+            <a:pPr marL="914400" lvl="1" indent="-457200">
+              <a:buFont typeface="+mj-lt"/>
+              <a:buAutoNum type="arabicPeriod"/>
+            </a:pPr>
+            <a:r>
+              <a:rPr lang="en-US" dirty="0"/>
+              <a:t>Further encrypted the int arrays by applying ROT1</a:t>
+            </a:r>
+          </a:p>
+          <a:p>
+            <a:pPr marL="914400" lvl="1" indent="-457200">
+              <a:buFont typeface="+mj-lt"/>
+              <a:buAutoNum type="arabicPeriod"/>
+            </a:pPr>
+            <a:r>
+              <a:rPr lang="en-US" dirty="0"/>
+              <a:t>Implemented manual Base64 decoding</a:t>
+            </a:r>
+          </a:p>
+        </p:txBody>
+      </p:sp>
     </p:spTree>
     <p:extLst>
       <p:ext uri="{BB962C8B-B14F-4D97-AF65-F5344CB8AC3E}">
-        <p14:creationId xmlns:p14="http://schemas.microsoft.com/office/powerpoint/2010/main" val="1092951323"/>
+        <p14:creationId xmlns:p14="http://schemas.microsoft.com/office/powerpoint/2010/main" val="2344274572"/>
       </p:ext>
     </p:extLst>
   </p:cSld>
@@ -7606,17 +8353,19 @@
       </p:sp>
       <p:pic>
         <p:nvPicPr>
-          <p:cNvPr id="5" name="Picture 4" descr="Text&#10;&#10;Description automatically generated">
-            <a:extLst>
-              <a:ext uri="{FF2B5EF4-FFF2-40B4-BE49-F238E27FC236}">
-                <a16:creationId xmlns:a16="http://schemas.microsoft.com/office/drawing/2014/main" id="{E27216BE-849E-C148-B0BC-EE44E876A663}"/>
+          <p:cNvPr id="7" name="Content Placeholder 6" descr="Graphical user interface, text, chat or text message&#10;&#10;Description automatically generated">
+            <a:extLst>
+              <a:ext uri="{FF2B5EF4-FFF2-40B4-BE49-F238E27FC236}">
+                <a16:creationId xmlns:a16="http://schemas.microsoft.com/office/drawing/2014/main" id="{0F79E74D-E484-C5DC-7335-406892AB7B54}"/>
               </a:ext>
             </a:extLst>
           </p:cNvPr>
           <p:cNvPicPr>
-            <a:picLocks noChangeAspect="1"/>
+            <a:picLocks noGrp="1" noChangeAspect="1"/>
           </p:cNvPicPr>
-          <p:nvPr/>
+          <p:nvPr>
+            <p:ph idx="1"/>
+          </p:nvPr>
         </p:nvPicPr>
         <p:blipFill>
           <a:blip r:embed="rId2">
@@ -7632,54 +8381,15 @@
         </p:blipFill>
         <p:spPr>
           <a:xfrm>
-            <a:off x="1666257" y="1690687"/>
-            <a:ext cx="4429743" cy="4553585"/>
+            <a:off x="3414338" y="2162712"/>
+            <a:ext cx="5363323" cy="3677163"/>
           </a:xfrm>
-          <a:prstGeom prst="rect">
-            <a:avLst/>
-          </a:prstGeom>
-        </p:spPr>
-      </p:pic>
-      <p:pic>
-        <p:nvPicPr>
-          <p:cNvPr id="7" name="Picture 6" descr="Text&#10;&#10;Description automatically generated">
-            <a:extLst>
-              <a:ext uri="{FF2B5EF4-FFF2-40B4-BE49-F238E27FC236}">
-                <a16:creationId xmlns:a16="http://schemas.microsoft.com/office/drawing/2014/main" id="{B51071DA-4946-5E2B-E820-06D726E22D10}"/>
-              </a:ext>
-            </a:extLst>
-          </p:cNvPr>
-          <p:cNvPicPr>
-            <a:picLocks noChangeAspect="1"/>
-          </p:cNvPicPr>
-          <p:nvPr/>
-        </p:nvPicPr>
-        <p:blipFill>
-          <a:blip r:embed="rId3">
-            <a:extLst>
-              <a:ext uri="{28A0092B-C50C-407E-A947-70E740481C1C}">
-                <a14:useLocalDpi xmlns:a14="http://schemas.microsoft.com/office/drawing/2010/main" val="0"/>
-              </a:ext>
-            </a:extLst>
-          </a:blip>
-          <a:stretch>
-            <a:fillRect/>
-          </a:stretch>
-        </p:blipFill>
-        <p:spPr>
-          <a:xfrm>
-            <a:off x="6371915" y="2505187"/>
-            <a:ext cx="4439270" cy="2924583"/>
-          </a:xfrm>
-          <a:prstGeom prst="rect">
-            <a:avLst/>
-          </a:prstGeom>
         </p:spPr>
       </p:pic>
     </p:spTree>
     <p:extLst>
       <p:ext uri="{BB962C8B-B14F-4D97-AF65-F5344CB8AC3E}">
-        <p14:creationId xmlns:p14="http://schemas.microsoft.com/office/powerpoint/2010/main" val="88909814"/>
+        <p14:creationId xmlns:p14="http://schemas.microsoft.com/office/powerpoint/2010/main" val="1128754286"/>
       </p:ext>
     </p:extLst>
   </p:cSld>

</xml_diff>